<commit_message>
Added a few more slides
New slides
</commit_message>
<xml_diff>
--- a/Presentation-and-Report/Presentation/PROSTATE CANCER MANAGEMENT APP.pptx
+++ b/Presentation-and-Report/Presentation/PROSTATE CANCER MANAGEMENT APP.pptx
@@ -513,6 +513,98 @@
           <a:p>
             <a:r>
               <a:rPr lang="en-US" dirty="0" smtClean="0"/>
+              <a:t>Explain </a:t>
+            </a:r>
+            <a:r>
+              <a:rPr lang="en-US" smtClean="0"/>
+              <a:t>about prostate.</a:t>
+            </a:r>
+            <a:endParaRPr lang="en-US"/>
+          </a:p>
+        </p:txBody>
+      </p:sp>
+      <p:sp>
+        <p:nvSpPr>
+          <p:cNvPr id="4" name="Slide Number Placeholder 3"/>
+          <p:cNvSpPr>
+            <a:spLocks noGrp="1"/>
+          </p:cNvSpPr>
+          <p:nvPr>
+            <p:ph type="sldNum" sz="quarter" idx="10"/>
+          </p:nvPr>
+        </p:nvSpPr>
+        <p:spPr/>
+        <p:txBody>
+          <a:bodyPr/>
+          <a:lstStyle/>
+          <a:p>
+            <a:fld id="{AA79EB7B-00A8-4C1F-8827-1C2000681E15}" type="slidenum">
+              <a:rPr lang="en-US" smtClean="0"/>
+              <a:t>2</a:t>
+            </a:fld>
+            <a:endParaRPr lang="en-US"/>
+          </a:p>
+        </p:txBody>
+      </p:sp>
+    </p:spTree>
+    <p:extLst>
+      <p:ext uri="{BB962C8B-B14F-4D97-AF65-F5344CB8AC3E}">
+        <p14:creationId xmlns:p14="http://schemas.microsoft.com/office/powerpoint/2010/main" val="679007982"/>
+      </p:ext>
+    </p:extLst>
+  </p:cSld>
+  <p:clrMapOvr>
+    <a:masterClrMapping/>
+  </p:clrMapOvr>
+</p:notes>
+</file>
+
+<file path=ppt/notesSlides/notesSlide2.xml><?xml version="1.0" encoding="utf-8"?>
+<p:notes xmlns:a="http://schemas.openxmlformats.org/drawingml/2006/main" xmlns:r="http://schemas.openxmlformats.org/officeDocument/2006/relationships" xmlns:p="http://schemas.openxmlformats.org/presentationml/2006/main">
+  <p:cSld>
+    <p:spTree>
+      <p:nvGrpSpPr>
+        <p:cNvPr id="1" name=""/>
+        <p:cNvGrpSpPr/>
+        <p:nvPr/>
+      </p:nvGrpSpPr>
+      <p:grpSpPr>
+        <a:xfrm>
+          <a:off x="0" y="0"/>
+          <a:ext cx="0" cy="0"/>
+          <a:chOff x="0" y="0"/>
+          <a:chExt cx="0" cy="0"/>
+        </a:xfrm>
+      </p:grpSpPr>
+      <p:sp>
+        <p:nvSpPr>
+          <p:cNvPr id="2" name="Slide Image Placeholder 1"/>
+          <p:cNvSpPr>
+            <a:spLocks noGrp="1" noRot="1" noChangeAspect="1"/>
+          </p:cNvSpPr>
+          <p:nvPr>
+            <p:ph type="sldImg"/>
+          </p:nvPr>
+        </p:nvSpPr>
+        <p:spPr/>
+      </p:sp>
+      <p:sp>
+        <p:nvSpPr>
+          <p:cNvPr id="3" name="Notes Placeholder 2"/>
+          <p:cNvSpPr>
+            <a:spLocks noGrp="1"/>
+          </p:cNvSpPr>
+          <p:nvPr>
+            <p:ph type="body" idx="1"/>
+          </p:nvPr>
+        </p:nvSpPr>
+        <p:spPr/>
+        <p:txBody>
+          <a:bodyPr/>
+          <a:lstStyle/>
+          <a:p>
+            <a:r>
+              <a:rPr lang="en-US" dirty="0" smtClean="0"/>
               <a:t>A</a:t>
             </a:r>
             <a:r>
@@ -563,7 +655,7 @@
 </p:notes>
 </file>
 
-<file path=ppt/notesSlides/notesSlide2.xml><?xml version="1.0" encoding="utf-8"?>
+<file path=ppt/notesSlides/notesSlide3.xml><?xml version="1.0" encoding="utf-8"?>
 <p:notes xmlns:a="http://schemas.openxmlformats.org/drawingml/2006/main" xmlns:r="http://schemas.openxmlformats.org/officeDocument/2006/relationships" xmlns:p="http://schemas.openxmlformats.org/presentationml/2006/main">
   <p:cSld>
     <p:spTree>
@@ -5223,37 +5315,7 @@
                 </a:effectLst>
                 <a:latin typeface="Baskerville Old Face" panose="02020602080505020303" pitchFamily="18" charset="0"/>
               </a:rPr>
-              <a:t>The </a:t>
-            </a:r>
-            <a:r>
-              <a:rPr lang="en-US" b="1" spc="50" dirty="0" smtClean="0">
-                <a:ln w="11430"/>
-                <a:gradFill>
-                  <a:gsLst>
-                    <a:gs pos="25000">
-                      <a:schemeClr val="accent2">
-                        <a:satMod val="155000"/>
-                      </a:schemeClr>
-                    </a:gs>
-                    <a:gs pos="100000">
-                      <a:schemeClr val="accent2">
-                        <a:shade val="45000"/>
-                        <a:satMod val="165000"/>
-                      </a:schemeClr>
-                    </a:gs>
-                  </a:gsLst>
-                  <a:lin ang="5400000"/>
-                </a:gradFill>
-                <a:effectLst>
-                  <a:outerShdw blurRad="76200" dist="50800" dir="5400000" algn="tl" rotWithShape="0">
-                    <a:srgbClr val="000000">
-                      <a:alpha val="65000"/>
-                    </a:srgbClr>
-                  </a:outerShdw>
-                </a:effectLst>
-                <a:latin typeface="Baskerville Old Face" panose="02020602080505020303" pitchFamily="18" charset="0"/>
-              </a:rPr>
-              <a:t>App</a:t>
+              <a:t>The App</a:t>
             </a:r>
             <a:endParaRPr lang="en-US" b="1" spc="50" dirty="0">
               <a:ln w="11430"/>

</xml_diff>

<commit_message>
Added more slides and info
</commit_message>
<xml_diff>
--- a/Presentation-and-Report/Presentation/PROSTATE CANCER MANAGEMENT APP.pptx
+++ b/Presentation-and-Report/Presentation/PROSTATE CANCER MANAGEMENT APP.pptx
@@ -5,17 +5,21 @@
     <p:sldMasterId id="2147483672" r:id="rId1"/>
   </p:sldMasterIdLst>
   <p:notesMasterIdLst>
-    <p:notesMasterId r:id="rId10"/>
+    <p:notesMasterId r:id="rId14"/>
   </p:notesMasterIdLst>
   <p:sldIdLst>
     <p:sldId id="256" r:id="rId2"/>
     <p:sldId id="263" r:id="rId3"/>
     <p:sldId id="257" r:id="rId4"/>
-    <p:sldId id="258" r:id="rId5"/>
-    <p:sldId id="259" r:id="rId6"/>
-    <p:sldId id="260" r:id="rId7"/>
-    <p:sldId id="261" r:id="rId8"/>
-    <p:sldId id="262" r:id="rId9"/>
+    <p:sldId id="264" r:id="rId5"/>
+    <p:sldId id="266" r:id="rId6"/>
+    <p:sldId id="267" r:id="rId7"/>
+    <p:sldId id="258" r:id="rId8"/>
+    <p:sldId id="259" r:id="rId9"/>
+    <p:sldId id="260" r:id="rId10"/>
+    <p:sldId id="261" r:id="rId11"/>
+    <p:sldId id="262" r:id="rId12"/>
+    <p:sldId id="265" r:id="rId13"/>
   </p:sldIdLst>
   <p:sldSz cx="9144000" cy="6858000" type="screen4x3"/>
   <p:notesSz cx="6858000" cy="9144000"/>
@@ -199,7 +203,7 @@
           <a:p>
             <a:fld id="{754A8365-883A-40FF-A356-D34F60D82EC2}" type="datetimeFigureOut">
               <a:rPr lang="en-US" smtClean="0"/>
-              <a:t>12/14/2016</a:t>
+              <a:t>12/15/2016</a:t>
             </a:fld>
             <a:endParaRPr lang="en-US"/>
           </a:p>
@@ -603,19 +607,7 @@
           <a:bodyPr/>
           <a:lstStyle/>
           <a:p>
-            <a:r>
-              <a:rPr lang="en-US" dirty="0" smtClean="0"/>
-              <a:t>A</a:t>
-            </a:r>
-            <a:r>
-              <a:rPr lang="en-US" baseline="0" dirty="0" smtClean="0"/>
-              <a:t> few screen shots of the Prostate Cancer Management App </a:t>
-            </a:r>
-            <a:r>
-              <a:rPr lang="en-US" baseline="0" smtClean="0"/>
-              <a:t>in action.</a:t>
-            </a:r>
-            <a:endParaRPr lang="en-US"/>
+            <a:endParaRPr lang="en-US" dirty="0"/>
           </a:p>
         </p:txBody>
       </p:sp>
@@ -636,7 +628,7 @@
           <a:p>
             <a:fld id="{AA79EB7B-00A8-4C1F-8827-1C2000681E15}" type="slidenum">
               <a:rPr lang="en-US" smtClean="0"/>
-              <a:t>6</a:t>
+              <a:t>4</a:t>
             </a:fld>
             <a:endParaRPr lang="en-US"/>
           </a:p>
@@ -645,7 +637,7 @@
     </p:spTree>
     <p:extLst>
       <p:ext uri="{BB962C8B-B14F-4D97-AF65-F5344CB8AC3E}">
-        <p14:creationId xmlns:p14="http://schemas.microsoft.com/office/powerpoint/2010/main" val="3962907936"/>
+        <p14:creationId xmlns:p14="http://schemas.microsoft.com/office/powerpoint/2010/main" val="58677227"/>
       </p:ext>
     </p:extLst>
   </p:cSld>
@@ -699,6 +691,217 @@
           <a:bodyPr/>
           <a:lstStyle/>
           <a:p>
+            <a:pPr marL="0" marR="0" indent="0" algn="l" defTabSz="914400" rtl="0" eaLnBrk="1" fontAlgn="auto" latinLnBrk="0" hangingPunct="1">
+              <a:lnSpc>
+                <a:spcPct val="100000"/>
+              </a:lnSpc>
+              <a:spcBef>
+                <a:spcPts val="0"/>
+              </a:spcBef>
+              <a:spcAft>
+                <a:spcPts val="0"/>
+              </a:spcAft>
+              <a:buClrTx/>
+              <a:buSzTx/>
+              <a:buFontTx/>
+              <a:buNone/>
+              <a:tabLst/>
+              <a:defRPr/>
+            </a:pPr>
+            <a:r>
+              <a:rPr lang="en-US" dirty="0" smtClean="0"/>
+              <a:t>The patient should discuss available options thoroughly with his doctor</a:t>
+            </a:r>
+          </a:p>
+          <a:p>
+            <a:r>
+              <a:rPr lang="en-US" dirty="0" smtClean="0"/>
+              <a:t>And thus, the creation</a:t>
+            </a:r>
+            <a:r>
+              <a:rPr lang="en-US" baseline="0" dirty="0" smtClean="0"/>
+              <a:t> of the prostate cancer app</a:t>
+            </a:r>
+            <a:endParaRPr lang="en-US" dirty="0"/>
+          </a:p>
+        </p:txBody>
+      </p:sp>
+      <p:sp>
+        <p:nvSpPr>
+          <p:cNvPr id="4" name="Slide Number Placeholder 3"/>
+          <p:cNvSpPr>
+            <a:spLocks noGrp="1"/>
+          </p:cNvSpPr>
+          <p:nvPr>
+            <p:ph type="sldNum" sz="quarter" idx="10"/>
+          </p:nvPr>
+        </p:nvSpPr>
+        <p:spPr/>
+        <p:txBody>
+          <a:bodyPr/>
+          <a:lstStyle/>
+          <a:p>
+            <a:fld id="{AA79EB7B-00A8-4C1F-8827-1C2000681E15}" type="slidenum">
+              <a:rPr lang="en-US" smtClean="0"/>
+              <a:t>6</a:t>
+            </a:fld>
+            <a:endParaRPr lang="en-US"/>
+          </a:p>
+        </p:txBody>
+      </p:sp>
+    </p:spTree>
+    <p:extLst>
+      <p:ext uri="{BB962C8B-B14F-4D97-AF65-F5344CB8AC3E}">
+        <p14:creationId xmlns:p14="http://schemas.microsoft.com/office/powerpoint/2010/main" val="1170621328"/>
+      </p:ext>
+    </p:extLst>
+  </p:cSld>
+  <p:clrMapOvr>
+    <a:masterClrMapping/>
+  </p:clrMapOvr>
+</p:notes>
+</file>
+
+<file path=ppt/notesSlides/notesSlide4.xml><?xml version="1.0" encoding="utf-8"?>
+<p:notes xmlns:a="http://schemas.openxmlformats.org/drawingml/2006/main" xmlns:r="http://schemas.openxmlformats.org/officeDocument/2006/relationships" xmlns:p="http://schemas.openxmlformats.org/presentationml/2006/main">
+  <p:cSld>
+    <p:spTree>
+      <p:nvGrpSpPr>
+        <p:cNvPr id="1" name=""/>
+        <p:cNvGrpSpPr/>
+        <p:nvPr/>
+      </p:nvGrpSpPr>
+      <p:grpSpPr>
+        <a:xfrm>
+          <a:off x="0" y="0"/>
+          <a:ext cx="0" cy="0"/>
+          <a:chOff x="0" y="0"/>
+          <a:chExt cx="0" cy="0"/>
+        </a:xfrm>
+      </p:grpSpPr>
+      <p:sp>
+        <p:nvSpPr>
+          <p:cNvPr id="2" name="Slide Image Placeholder 1"/>
+          <p:cNvSpPr>
+            <a:spLocks noGrp="1" noRot="1" noChangeAspect="1"/>
+          </p:cNvSpPr>
+          <p:nvPr>
+            <p:ph type="sldImg"/>
+          </p:nvPr>
+        </p:nvSpPr>
+        <p:spPr/>
+      </p:sp>
+      <p:sp>
+        <p:nvSpPr>
+          <p:cNvPr id="3" name="Notes Placeholder 2"/>
+          <p:cNvSpPr>
+            <a:spLocks noGrp="1"/>
+          </p:cNvSpPr>
+          <p:nvPr>
+            <p:ph type="body" idx="1"/>
+          </p:nvPr>
+        </p:nvSpPr>
+        <p:spPr/>
+        <p:txBody>
+          <a:bodyPr/>
+          <a:lstStyle/>
+          <a:p>
+            <a:r>
+              <a:rPr lang="en-US" dirty="0" smtClean="0"/>
+              <a:t>A</a:t>
+            </a:r>
+            <a:r>
+              <a:rPr lang="en-US" baseline="0" dirty="0" smtClean="0"/>
+              <a:t> few screen shots of the Prostate Cancer Management App </a:t>
+            </a:r>
+            <a:r>
+              <a:rPr lang="en-US" baseline="0" smtClean="0"/>
+              <a:t>in action.</a:t>
+            </a:r>
+            <a:endParaRPr lang="en-US"/>
+          </a:p>
+        </p:txBody>
+      </p:sp>
+      <p:sp>
+        <p:nvSpPr>
+          <p:cNvPr id="4" name="Slide Number Placeholder 3"/>
+          <p:cNvSpPr>
+            <a:spLocks noGrp="1"/>
+          </p:cNvSpPr>
+          <p:nvPr>
+            <p:ph type="sldNum" sz="quarter" idx="10"/>
+          </p:nvPr>
+        </p:nvSpPr>
+        <p:spPr/>
+        <p:txBody>
+          <a:bodyPr/>
+          <a:lstStyle/>
+          <a:p>
+            <a:fld id="{AA79EB7B-00A8-4C1F-8827-1C2000681E15}" type="slidenum">
+              <a:rPr lang="en-US" smtClean="0"/>
+              <a:t>9</a:t>
+            </a:fld>
+            <a:endParaRPr lang="en-US"/>
+          </a:p>
+        </p:txBody>
+      </p:sp>
+    </p:spTree>
+    <p:extLst>
+      <p:ext uri="{BB962C8B-B14F-4D97-AF65-F5344CB8AC3E}">
+        <p14:creationId xmlns:p14="http://schemas.microsoft.com/office/powerpoint/2010/main" val="3962907936"/>
+      </p:ext>
+    </p:extLst>
+  </p:cSld>
+  <p:clrMapOvr>
+    <a:masterClrMapping/>
+  </p:clrMapOvr>
+</p:notes>
+</file>
+
+<file path=ppt/notesSlides/notesSlide5.xml><?xml version="1.0" encoding="utf-8"?>
+<p:notes xmlns:a="http://schemas.openxmlformats.org/drawingml/2006/main" xmlns:r="http://schemas.openxmlformats.org/officeDocument/2006/relationships" xmlns:p="http://schemas.openxmlformats.org/presentationml/2006/main">
+  <p:cSld>
+    <p:spTree>
+      <p:nvGrpSpPr>
+        <p:cNvPr id="1" name=""/>
+        <p:cNvGrpSpPr/>
+        <p:nvPr/>
+      </p:nvGrpSpPr>
+      <p:grpSpPr>
+        <a:xfrm>
+          <a:off x="0" y="0"/>
+          <a:ext cx="0" cy="0"/>
+          <a:chOff x="0" y="0"/>
+          <a:chExt cx="0" cy="0"/>
+        </a:xfrm>
+      </p:grpSpPr>
+      <p:sp>
+        <p:nvSpPr>
+          <p:cNvPr id="2" name="Slide Image Placeholder 1"/>
+          <p:cNvSpPr>
+            <a:spLocks noGrp="1" noRot="1" noChangeAspect="1"/>
+          </p:cNvSpPr>
+          <p:nvPr>
+            <p:ph type="sldImg"/>
+          </p:nvPr>
+        </p:nvSpPr>
+        <p:spPr/>
+      </p:sp>
+      <p:sp>
+        <p:nvSpPr>
+          <p:cNvPr id="3" name="Notes Placeholder 2"/>
+          <p:cNvSpPr>
+            <a:spLocks noGrp="1"/>
+          </p:cNvSpPr>
+          <p:nvPr>
+            <p:ph type="body" idx="1"/>
+          </p:nvPr>
+        </p:nvSpPr>
+        <p:spPr/>
+        <p:txBody>
+          <a:bodyPr/>
+          <a:lstStyle/>
+          <a:p>
             <a:pPr marL="171450" indent="-171450">
               <a:buFont typeface="Arial" panose="020B0604020202020204" pitchFamily="34" charset="0"/>
               <a:buChar char="•"/>
@@ -805,7 +1008,7 @@
           <a:p>
             <a:fld id="{AA79EB7B-00A8-4C1F-8827-1C2000681E15}" type="slidenum">
               <a:rPr lang="en-US" smtClean="0"/>
-              <a:t>7</a:t>
+              <a:t>10</a:t>
             </a:fld>
             <a:endParaRPr lang="en-US"/>
           </a:p>
@@ -1060,7 +1263,7 @@
           <a:p>
             <a:fld id="{391A5948-2E16-4588-BF79-23203B7FDDF0}" type="datetimeFigureOut">
               <a:rPr lang="en-US" smtClean="0"/>
-              <a:t>12/14/2016</a:t>
+              <a:t>12/15/2016</a:t>
             </a:fld>
             <a:endParaRPr lang="en-US"/>
           </a:p>
@@ -1338,7 +1541,7 @@
           <a:p>
             <a:fld id="{391A5948-2E16-4588-BF79-23203B7FDDF0}" type="datetimeFigureOut">
               <a:rPr lang="en-US" smtClean="0"/>
-              <a:t>12/14/2016</a:t>
+              <a:t>12/15/2016</a:t>
             </a:fld>
             <a:endParaRPr lang="en-US"/>
           </a:p>
@@ -1561,7 +1764,7 @@
           <a:p>
             <a:fld id="{391A5948-2E16-4588-BF79-23203B7FDDF0}" type="datetimeFigureOut">
               <a:rPr lang="en-US" smtClean="0"/>
-              <a:t>12/14/2016</a:t>
+              <a:t>12/15/2016</a:t>
             </a:fld>
             <a:endParaRPr lang="en-US"/>
           </a:p>
@@ -1756,7 +1959,7 @@
           <a:p>
             <a:fld id="{391A5948-2E16-4588-BF79-23203B7FDDF0}" type="datetimeFigureOut">
               <a:rPr lang="en-US" smtClean="0"/>
-              <a:t>12/14/2016</a:t>
+              <a:t>12/15/2016</a:t>
             </a:fld>
             <a:endParaRPr lang="en-US"/>
           </a:p>
@@ -2036,7 +2239,7 @@
           <a:p>
             <a:fld id="{391A5948-2E16-4588-BF79-23203B7FDDF0}" type="datetimeFigureOut">
               <a:rPr lang="en-US" smtClean="0"/>
-              <a:t>12/14/2016</a:t>
+              <a:t>12/15/2016</a:t>
             </a:fld>
             <a:endParaRPr lang="en-US"/>
           </a:p>
@@ -2509,7 +2712,7 @@
           <a:p>
             <a:fld id="{391A5948-2E16-4588-BF79-23203B7FDDF0}" type="datetimeFigureOut">
               <a:rPr lang="en-US" smtClean="0"/>
-              <a:t>12/14/2016</a:t>
+              <a:t>12/15/2016</a:t>
             </a:fld>
             <a:endParaRPr lang="en-US"/>
           </a:p>
@@ -2964,7 +3167,7 @@
           <a:p>
             <a:fld id="{391A5948-2E16-4588-BF79-23203B7FDDF0}" type="datetimeFigureOut">
               <a:rPr lang="en-US" smtClean="0"/>
-              <a:t>12/14/2016</a:t>
+              <a:t>12/15/2016</a:t>
             </a:fld>
             <a:endParaRPr lang="en-US"/>
           </a:p>
@@ -3102,7 +3305,7 @@
           <a:p>
             <a:fld id="{391A5948-2E16-4588-BF79-23203B7FDDF0}" type="datetimeFigureOut">
               <a:rPr lang="en-US" smtClean="0"/>
-              <a:t>12/14/2016</a:t>
+              <a:t>12/15/2016</a:t>
             </a:fld>
             <a:endParaRPr lang="en-US"/>
           </a:p>
@@ -3263,7 +3466,7 @@
           <a:p>
             <a:fld id="{391A5948-2E16-4588-BF79-23203B7FDDF0}" type="datetimeFigureOut">
               <a:rPr lang="en-US" smtClean="0"/>
-              <a:t>12/14/2016</a:t>
+              <a:t>12/15/2016</a:t>
             </a:fld>
             <a:endParaRPr lang="en-US"/>
           </a:p>
@@ -3657,7 +3860,7 @@
           <a:p>
             <a:fld id="{391A5948-2E16-4588-BF79-23203B7FDDF0}" type="datetimeFigureOut">
               <a:rPr lang="en-US" smtClean="0"/>
-              <a:t>12/14/2016</a:t>
+              <a:t>12/15/2016</a:t>
             </a:fld>
             <a:endParaRPr lang="en-US"/>
           </a:p>
@@ -4057,7 +4260,7 @@
           <a:p>
             <a:fld id="{391A5948-2E16-4588-BF79-23203B7FDDF0}" type="datetimeFigureOut">
               <a:rPr lang="en-US" smtClean="0"/>
-              <a:t>12/14/2016</a:t>
+              <a:t>12/15/2016</a:t>
             </a:fld>
             <a:endParaRPr lang="en-US"/>
           </a:p>
@@ -4267,7 +4470,7 @@
           <a:p>
             <a:fld id="{391A5948-2E16-4588-BF79-23203B7FDDF0}" type="datetimeFigureOut">
               <a:rPr lang="en-US" smtClean="0"/>
-              <a:t>12/14/2016</a:t>
+              <a:t>12/15/2016</a:t>
             </a:fld>
             <a:endParaRPr lang="en-US"/>
           </a:p>
@@ -4820,854 +5023,7 @@
 </p:sld>
 </file>
 
-<file path=ppt/slides/slide2.xml><?xml version="1.0" encoding="utf-8"?>
-<p:sld xmlns:a="http://schemas.openxmlformats.org/drawingml/2006/main" xmlns:r="http://schemas.openxmlformats.org/officeDocument/2006/relationships" xmlns:p="http://schemas.openxmlformats.org/presentationml/2006/main">
-  <p:cSld>
-    <p:spTree>
-      <p:nvGrpSpPr>
-        <p:cNvPr id="1" name=""/>
-        <p:cNvGrpSpPr/>
-        <p:nvPr/>
-      </p:nvGrpSpPr>
-      <p:grpSpPr>
-        <a:xfrm>
-          <a:off x="0" y="0"/>
-          <a:ext cx="0" cy="0"/>
-          <a:chOff x="0" y="0"/>
-          <a:chExt cx="0" cy="0"/>
-        </a:xfrm>
-      </p:grpSpPr>
-      <p:sp>
-        <p:nvSpPr>
-          <p:cNvPr id="2" name="Content Placeholder 1"/>
-          <p:cNvSpPr>
-            <a:spLocks noGrp="1"/>
-          </p:cNvSpPr>
-          <p:nvPr>
-            <p:ph sz="quarter" idx="13"/>
-          </p:nvPr>
-        </p:nvSpPr>
-        <p:spPr/>
-        <p:txBody>
-          <a:bodyPr>
-            <a:normAutofit/>
-          </a:bodyPr>
-          <a:lstStyle/>
-          <a:p>
-            <a:endParaRPr lang="en-US" sz="3100" dirty="0" smtClean="0">
-              <a:latin typeface="Arial" panose="020B0604020202020204" pitchFamily="34" charset="0"/>
-              <a:cs typeface="Arial" panose="020B0604020202020204" pitchFamily="34" charset="0"/>
-            </a:endParaRPr>
-          </a:p>
-          <a:p>
-            <a:r>
-              <a:rPr lang="en-US" sz="3100" dirty="0" smtClean="0">
-                <a:latin typeface="Arial" panose="020B0604020202020204" pitchFamily="34" charset="0"/>
-                <a:cs typeface="Arial" panose="020B0604020202020204" pitchFamily="34" charset="0"/>
-              </a:rPr>
-              <a:t>The </a:t>
-            </a:r>
-            <a:r>
-              <a:rPr lang="en-US" sz="3100" dirty="0">
-                <a:latin typeface="Arial" panose="020B0604020202020204" pitchFamily="34" charset="0"/>
-                <a:cs typeface="Arial" panose="020B0604020202020204" pitchFamily="34" charset="0"/>
-              </a:rPr>
-              <a:t>prostate is a gland in the male reproductive system. It makes most of the semen that carries sperm. The walnut-sized gland is located beneath the bladder and surrounds the upper part of the urethra, the tube that carries urine from the bladder.</a:t>
-            </a:r>
-          </a:p>
-        </p:txBody>
-      </p:sp>
-      <p:sp>
-        <p:nvSpPr>
-          <p:cNvPr id="3" name="Title 2"/>
-          <p:cNvSpPr>
-            <a:spLocks noGrp="1"/>
-          </p:cNvSpPr>
-          <p:nvPr>
-            <p:ph type="title"/>
-          </p:nvPr>
-        </p:nvSpPr>
-        <p:spPr>
-          <a:noFill/>
-        </p:spPr>
-        <p:txBody>
-          <a:bodyPr>
-            <a:scene3d>
-              <a:camera prst="orthographicFront"/>
-              <a:lightRig rig="soft" dir="tl">
-                <a:rot lat="0" lon="0" rev="0"/>
-              </a:lightRig>
-            </a:scene3d>
-            <a:sp3d contourW="25400" prstMaterial="matte">
-              <a:bevelT w="25400" h="55880" prst="artDeco"/>
-              <a:contourClr>
-                <a:schemeClr val="accent2">
-                  <a:tint val="20000"/>
-                </a:schemeClr>
-              </a:contourClr>
-            </a:sp3d>
-          </a:bodyPr>
-          <a:lstStyle/>
-          <a:p>
-            <a:pPr algn="ctr"/>
-            <a:r>
-              <a:rPr lang="en-US" b="1" spc="50" dirty="0" smtClean="0">
-                <a:ln w="11430"/>
-                <a:gradFill>
-                  <a:gsLst>
-                    <a:gs pos="25000">
-                      <a:schemeClr val="accent2">
-                        <a:satMod val="155000"/>
-                      </a:schemeClr>
-                    </a:gs>
-                    <a:gs pos="100000">
-                      <a:schemeClr val="accent2">
-                        <a:shade val="45000"/>
-                        <a:satMod val="165000"/>
-                      </a:schemeClr>
-                    </a:gs>
-                  </a:gsLst>
-                  <a:lin ang="5400000"/>
-                </a:gradFill>
-                <a:effectLst>
-                  <a:outerShdw blurRad="76200" dist="50800" dir="5400000" algn="tl" rotWithShape="0">
-                    <a:srgbClr val="000000">
-                      <a:alpha val="65000"/>
-                    </a:srgbClr>
-                  </a:outerShdw>
-                </a:effectLst>
-              </a:rPr>
-              <a:t>What is Prostate?</a:t>
-            </a:r>
-            <a:endParaRPr lang="en-US" b="1" spc="50" dirty="0">
-              <a:ln w="11430"/>
-              <a:gradFill>
-                <a:gsLst>
-                  <a:gs pos="25000">
-                    <a:schemeClr val="accent2">
-                      <a:satMod val="155000"/>
-                    </a:schemeClr>
-                  </a:gs>
-                  <a:gs pos="100000">
-                    <a:schemeClr val="accent2">
-                      <a:shade val="45000"/>
-                      <a:satMod val="165000"/>
-                    </a:schemeClr>
-                  </a:gs>
-                </a:gsLst>
-                <a:lin ang="5400000"/>
-              </a:gradFill>
-              <a:effectLst>
-                <a:outerShdw blurRad="76200" dist="50800" dir="5400000" algn="tl" rotWithShape="0">
-                  <a:srgbClr val="000000">
-                    <a:alpha val="65000"/>
-                  </a:srgbClr>
-                </a:outerShdw>
-              </a:effectLst>
-            </a:endParaRPr>
-          </a:p>
-        </p:txBody>
-      </p:sp>
-    </p:spTree>
-    <p:extLst>
-      <p:ext uri="{BB962C8B-B14F-4D97-AF65-F5344CB8AC3E}">
-        <p14:creationId xmlns:p14="http://schemas.microsoft.com/office/powerpoint/2010/main" val="812896615"/>
-      </p:ext>
-    </p:extLst>
-  </p:cSld>
-  <p:clrMapOvr>
-    <a:masterClrMapping/>
-  </p:clrMapOvr>
-</p:sld>
-</file>
-
-<file path=ppt/slides/slide3.xml><?xml version="1.0" encoding="utf-8"?>
-<p:sld xmlns:a="http://schemas.openxmlformats.org/drawingml/2006/main" xmlns:r="http://schemas.openxmlformats.org/officeDocument/2006/relationships" xmlns:p="http://schemas.openxmlformats.org/presentationml/2006/main">
-  <p:cSld>
-    <p:spTree>
-      <p:nvGrpSpPr>
-        <p:cNvPr id="1" name=""/>
-        <p:cNvGrpSpPr/>
-        <p:nvPr/>
-      </p:nvGrpSpPr>
-      <p:grpSpPr>
-        <a:xfrm>
-          <a:off x="0" y="0"/>
-          <a:ext cx="0" cy="0"/>
-          <a:chOff x="0" y="0"/>
-          <a:chExt cx="0" cy="0"/>
-        </a:xfrm>
-      </p:grpSpPr>
-      <p:sp>
-        <p:nvSpPr>
-          <p:cNvPr id="2" name="Content Placeholder 1"/>
-          <p:cNvSpPr>
-            <a:spLocks noGrp="1"/>
-          </p:cNvSpPr>
-          <p:nvPr>
-            <p:ph sz="quarter" idx="13"/>
-          </p:nvPr>
-        </p:nvSpPr>
-        <p:spPr>
-          <a:xfrm>
-            <a:off x="381000" y="1447800"/>
-            <a:ext cx="7680960" cy="4587240"/>
-          </a:xfrm>
-        </p:spPr>
-        <p:txBody>
-          <a:bodyPr/>
-          <a:lstStyle/>
-          <a:p>
-            <a:pPr marL="285750" indent="-285750">
-              <a:buFont typeface="Arial" panose="020B0604020202020204" pitchFamily="34" charset="0"/>
-              <a:buChar char="•"/>
-            </a:pPr>
-            <a:endParaRPr lang="en-US" dirty="0" smtClean="0"/>
-          </a:p>
-          <a:p>
-            <a:pPr marL="285750" indent="-285750">
-              <a:buFont typeface="Arial" panose="020B0604020202020204" pitchFamily="34" charset="0"/>
-              <a:buChar char="•"/>
-            </a:pPr>
-            <a:r>
-              <a:rPr lang="en-US" sz="2800" dirty="0" smtClean="0">
-                <a:latin typeface="Arial" panose="020B0604020202020204" pitchFamily="34" charset="0"/>
-                <a:cs typeface="Arial" panose="020B0604020202020204" pitchFamily="34" charset="0"/>
-              </a:rPr>
-              <a:t>Cancer </a:t>
-            </a:r>
-            <a:r>
-              <a:rPr lang="en-US" sz="2800" dirty="0">
-                <a:latin typeface="Arial" panose="020B0604020202020204" pitchFamily="34" charset="0"/>
-                <a:cs typeface="Arial" panose="020B0604020202020204" pitchFamily="34" charset="0"/>
-              </a:rPr>
-              <a:t>is the growth of abnormal cells. </a:t>
-            </a:r>
-            <a:endParaRPr lang="en-US" sz="2800" dirty="0" smtClean="0">
-              <a:latin typeface="Arial" panose="020B0604020202020204" pitchFamily="34" charset="0"/>
-              <a:cs typeface="Arial" panose="020B0604020202020204" pitchFamily="34" charset="0"/>
-            </a:endParaRPr>
-          </a:p>
-          <a:p>
-            <a:pPr marL="285750" indent="-285750">
-              <a:buFont typeface="Arial" panose="020B0604020202020204" pitchFamily="34" charset="0"/>
-              <a:buChar char="•"/>
-            </a:pPr>
-            <a:r>
-              <a:rPr lang="en-US" sz="2800" dirty="0" smtClean="0">
-                <a:latin typeface="Arial" panose="020B0604020202020204" pitchFamily="34" charset="0"/>
-                <a:cs typeface="Arial" panose="020B0604020202020204" pitchFamily="34" charset="0"/>
-              </a:rPr>
-              <a:t>Cancer </a:t>
-            </a:r>
-            <a:r>
-              <a:rPr lang="en-US" sz="2800" dirty="0">
-                <a:latin typeface="Arial" panose="020B0604020202020204" pitchFamily="34" charset="0"/>
-                <a:cs typeface="Arial" panose="020B0604020202020204" pitchFamily="34" charset="0"/>
-              </a:rPr>
-              <a:t>cells can invade and damage normal tissue. </a:t>
-            </a:r>
-            <a:endParaRPr lang="en-US" sz="2800" dirty="0" smtClean="0">
-              <a:latin typeface="Arial" panose="020B0604020202020204" pitchFamily="34" charset="0"/>
-              <a:cs typeface="Arial" panose="020B0604020202020204" pitchFamily="34" charset="0"/>
-            </a:endParaRPr>
-          </a:p>
-          <a:p>
-            <a:pPr marL="285750" indent="-285750">
-              <a:buFont typeface="Arial" panose="020B0604020202020204" pitchFamily="34" charset="0"/>
-              <a:buChar char="•"/>
-            </a:pPr>
-            <a:r>
-              <a:rPr lang="en-US" sz="2800" dirty="0" smtClean="0">
-                <a:latin typeface="Arial" panose="020B0604020202020204" pitchFamily="34" charset="0"/>
-                <a:cs typeface="Arial" panose="020B0604020202020204" pitchFamily="34" charset="0"/>
-              </a:rPr>
-              <a:t>Prostate </a:t>
-            </a:r>
-            <a:r>
-              <a:rPr lang="en-US" sz="2800" dirty="0">
-                <a:latin typeface="Arial" panose="020B0604020202020204" pitchFamily="34" charset="0"/>
-                <a:cs typeface="Arial" panose="020B0604020202020204" pitchFamily="34" charset="0"/>
-              </a:rPr>
-              <a:t>cancer starts in the cells of the prostate. </a:t>
-            </a:r>
-            <a:endParaRPr lang="en-US" sz="2800" dirty="0" smtClean="0">
-              <a:latin typeface="Arial" panose="020B0604020202020204" pitchFamily="34" charset="0"/>
-              <a:cs typeface="Arial" panose="020B0604020202020204" pitchFamily="34" charset="0"/>
-            </a:endParaRPr>
-          </a:p>
-          <a:p>
-            <a:pPr marL="285750" indent="-285750">
-              <a:buFont typeface="Arial" panose="020B0604020202020204" pitchFamily="34" charset="0"/>
-              <a:buChar char="•"/>
-            </a:pPr>
-            <a:r>
-              <a:rPr lang="en-US" sz="2800" dirty="0" smtClean="0">
-                <a:latin typeface="Arial" panose="020B0604020202020204" pitchFamily="34" charset="0"/>
-                <a:cs typeface="Arial" panose="020B0604020202020204" pitchFamily="34" charset="0"/>
-              </a:rPr>
-              <a:t>Some </a:t>
-            </a:r>
-            <a:r>
-              <a:rPr lang="en-US" sz="2800" dirty="0">
-                <a:latin typeface="Arial" panose="020B0604020202020204" pitchFamily="34" charset="0"/>
-                <a:cs typeface="Arial" panose="020B0604020202020204" pitchFamily="34" charset="0"/>
-              </a:rPr>
-              <a:t>prostate cancers can grow and spread quickly. But most of them grow slowly.</a:t>
-            </a:r>
-          </a:p>
-        </p:txBody>
-      </p:sp>
-      <p:sp>
-        <p:nvSpPr>
-          <p:cNvPr id="3" name="Title 2"/>
-          <p:cNvSpPr>
-            <a:spLocks noGrp="1"/>
-          </p:cNvSpPr>
-          <p:nvPr>
-            <p:ph type="title"/>
-          </p:nvPr>
-        </p:nvSpPr>
-        <p:spPr/>
-        <p:txBody>
-          <a:bodyPr>
-            <a:scene3d>
-              <a:camera prst="orthographicFront"/>
-              <a:lightRig rig="soft" dir="tl">
-                <a:rot lat="0" lon="0" rev="0"/>
-              </a:lightRig>
-            </a:scene3d>
-            <a:sp3d contourW="25400" prstMaterial="matte">
-              <a:bevelT w="25400" h="55880" prst="artDeco"/>
-              <a:contourClr>
-                <a:schemeClr val="accent2">
-                  <a:tint val="20000"/>
-                </a:schemeClr>
-              </a:contourClr>
-            </a:sp3d>
-          </a:bodyPr>
-          <a:lstStyle/>
-          <a:p>
-            <a:pPr algn="ctr"/>
-            <a:r>
-              <a:rPr lang="en-US" b="1" spc="50" dirty="0">
-                <a:ln w="11430"/>
-                <a:gradFill>
-                  <a:gsLst>
-                    <a:gs pos="25000">
-                      <a:schemeClr val="accent2">
-                        <a:satMod val="155000"/>
-                      </a:schemeClr>
-                    </a:gs>
-                    <a:gs pos="100000">
-                      <a:schemeClr val="accent2">
-                        <a:shade val="45000"/>
-                        <a:satMod val="165000"/>
-                      </a:schemeClr>
-                    </a:gs>
-                  </a:gsLst>
-                  <a:lin ang="5400000"/>
-                </a:gradFill>
-                <a:effectLst>
-                  <a:outerShdw blurRad="76200" dist="50800" dir="5400000" algn="tl" rotWithShape="0">
-                    <a:srgbClr val="000000">
-                      <a:alpha val="65000"/>
-                    </a:srgbClr>
-                  </a:outerShdw>
-                </a:effectLst>
-                <a:latin typeface="Baskerville Old Face" panose="02020602080505020303" pitchFamily="18" charset="0"/>
-              </a:rPr>
-              <a:t>What is prostate cancer?</a:t>
-            </a:r>
-          </a:p>
-        </p:txBody>
-      </p:sp>
-    </p:spTree>
-    <p:extLst>
-      <p:ext uri="{BB962C8B-B14F-4D97-AF65-F5344CB8AC3E}">
-        <p14:creationId xmlns:p14="http://schemas.microsoft.com/office/powerpoint/2010/main" val="1731414376"/>
-      </p:ext>
-    </p:extLst>
-  </p:cSld>
-  <p:clrMapOvr>
-    <a:masterClrMapping/>
-  </p:clrMapOvr>
-</p:sld>
-</file>
-
-<file path=ppt/slides/slide4.xml><?xml version="1.0" encoding="utf-8"?>
-<p:sld xmlns:a="http://schemas.openxmlformats.org/drawingml/2006/main" xmlns:r="http://schemas.openxmlformats.org/officeDocument/2006/relationships" xmlns:p="http://schemas.openxmlformats.org/presentationml/2006/main">
-  <p:cSld>
-    <p:spTree>
-      <p:nvGrpSpPr>
-        <p:cNvPr id="1" name=""/>
-        <p:cNvGrpSpPr/>
-        <p:nvPr/>
-      </p:nvGrpSpPr>
-      <p:grpSpPr>
-        <a:xfrm>
-          <a:off x="0" y="0"/>
-          <a:ext cx="0" cy="0"/>
-          <a:chOff x="0" y="0"/>
-          <a:chExt cx="0" cy="0"/>
-        </a:xfrm>
-      </p:grpSpPr>
-      <p:sp>
-        <p:nvSpPr>
-          <p:cNvPr id="2" name="Content Placeholder 1"/>
-          <p:cNvSpPr>
-            <a:spLocks noGrp="1"/>
-          </p:cNvSpPr>
-          <p:nvPr>
-            <p:ph sz="quarter" idx="13"/>
-          </p:nvPr>
-        </p:nvSpPr>
-        <p:spPr/>
-        <p:txBody>
-          <a:bodyPr>
-            <a:normAutofit fontScale="70000" lnSpcReduction="20000"/>
-          </a:bodyPr>
-          <a:lstStyle/>
-          <a:p>
-            <a:r>
-              <a:rPr lang="en-US" sz="4500" dirty="0">
-                <a:latin typeface="Arial" panose="020B0604020202020204" pitchFamily="34" charset="0"/>
-                <a:cs typeface="Arial" panose="020B0604020202020204" pitchFamily="34" charset="0"/>
-              </a:rPr>
-              <a:t>The Prostate Cancer Management App is about making it easy for medical patients which are in care for Prostate Cancer to manage their medical data. It is very useful because the patients </a:t>
-            </a:r>
-            <a:r>
-              <a:rPr lang="en-US" sz="4500" dirty="0" smtClean="0">
-                <a:latin typeface="Arial" panose="020B0604020202020204" pitchFamily="34" charset="0"/>
-                <a:cs typeface="Arial" panose="020B0604020202020204" pitchFamily="34" charset="0"/>
-              </a:rPr>
-              <a:t>can, </a:t>
-            </a:r>
-            <a:r>
-              <a:rPr lang="en-US" sz="4500" dirty="0">
-                <a:latin typeface="Arial" panose="020B0604020202020204" pitchFamily="34" charset="0"/>
-                <a:cs typeface="Arial" panose="020B0604020202020204" pitchFamily="34" charset="0"/>
-              </a:rPr>
-              <a:t>from their smartphones, access the app, upload new data as requested by their doctor, and then view the data they uploaded or view the results which would be automatically generated by parameters created by the doctors.</a:t>
-            </a:r>
-          </a:p>
-          <a:p>
-            <a:endParaRPr lang="en-US" dirty="0"/>
-          </a:p>
-        </p:txBody>
-      </p:sp>
-      <p:sp>
-        <p:nvSpPr>
-          <p:cNvPr id="3" name="Title 2"/>
-          <p:cNvSpPr>
-            <a:spLocks noGrp="1"/>
-          </p:cNvSpPr>
-          <p:nvPr>
-            <p:ph type="title"/>
-          </p:nvPr>
-        </p:nvSpPr>
-        <p:spPr/>
-        <p:txBody>
-          <a:bodyPr>
-            <a:scene3d>
-              <a:camera prst="orthographicFront"/>
-              <a:lightRig rig="soft" dir="tl">
-                <a:rot lat="0" lon="0" rev="0"/>
-              </a:lightRig>
-            </a:scene3d>
-            <a:sp3d contourW="25400" prstMaterial="matte">
-              <a:bevelT w="25400" h="55880" prst="artDeco"/>
-              <a:contourClr>
-                <a:schemeClr val="accent2">
-                  <a:tint val="20000"/>
-                </a:schemeClr>
-              </a:contourClr>
-            </a:sp3d>
-          </a:bodyPr>
-          <a:lstStyle/>
-          <a:p>
-            <a:pPr algn="ctr"/>
-            <a:r>
-              <a:rPr lang="en-US" b="1" spc="50" dirty="0" smtClean="0">
-                <a:ln w="11430"/>
-                <a:gradFill>
-                  <a:gsLst>
-                    <a:gs pos="25000">
-                      <a:schemeClr val="accent2">
-                        <a:satMod val="155000"/>
-                      </a:schemeClr>
-                    </a:gs>
-                    <a:gs pos="100000">
-                      <a:schemeClr val="accent2">
-                        <a:shade val="45000"/>
-                        <a:satMod val="165000"/>
-                      </a:schemeClr>
-                    </a:gs>
-                  </a:gsLst>
-                  <a:lin ang="5400000"/>
-                </a:gradFill>
-                <a:effectLst>
-                  <a:outerShdw blurRad="76200" dist="50800" dir="5400000" algn="tl" rotWithShape="0">
-                    <a:srgbClr val="000000">
-                      <a:alpha val="65000"/>
-                    </a:srgbClr>
-                  </a:outerShdw>
-                </a:effectLst>
-                <a:latin typeface="Baskerville Old Face" panose="02020602080505020303" pitchFamily="18" charset="0"/>
-              </a:rPr>
-              <a:t>The App</a:t>
-            </a:r>
-            <a:endParaRPr lang="en-US" b="1" spc="50" dirty="0">
-              <a:ln w="11430"/>
-              <a:gradFill>
-                <a:gsLst>
-                  <a:gs pos="25000">
-                    <a:schemeClr val="accent2">
-                      <a:satMod val="155000"/>
-                    </a:schemeClr>
-                  </a:gs>
-                  <a:gs pos="100000">
-                    <a:schemeClr val="accent2">
-                      <a:shade val="45000"/>
-                      <a:satMod val="165000"/>
-                    </a:schemeClr>
-                  </a:gs>
-                </a:gsLst>
-                <a:lin ang="5400000"/>
-              </a:gradFill>
-              <a:effectLst>
-                <a:outerShdw blurRad="76200" dist="50800" dir="5400000" algn="tl" rotWithShape="0">
-                  <a:srgbClr val="000000">
-                    <a:alpha val="65000"/>
-                  </a:srgbClr>
-                </a:outerShdw>
-              </a:effectLst>
-              <a:latin typeface="Baskerville Old Face" panose="02020602080505020303" pitchFamily="18" charset="0"/>
-            </a:endParaRPr>
-          </a:p>
-        </p:txBody>
-      </p:sp>
-    </p:spTree>
-    <p:extLst>
-      <p:ext uri="{BB962C8B-B14F-4D97-AF65-F5344CB8AC3E}">
-        <p14:creationId xmlns:p14="http://schemas.microsoft.com/office/powerpoint/2010/main" val="2635699890"/>
-      </p:ext>
-    </p:extLst>
-  </p:cSld>
-  <p:clrMapOvr>
-    <a:masterClrMapping/>
-  </p:clrMapOvr>
-</p:sld>
-</file>
-
-<file path=ppt/slides/slide5.xml><?xml version="1.0" encoding="utf-8"?>
-<p:sld xmlns:a="http://schemas.openxmlformats.org/drawingml/2006/main" xmlns:r="http://schemas.openxmlformats.org/officeDocument/2006/relationships" xmlns:p="http://schemas.openxmlformats.org/presentationml/2006/main">
-  <p:cSld>
-    <p:spTree>
-      <p:nvGrpSpPr>
-        <p:cNvPr id="1" name=""/>
-        <p:cNvGrpSpPr/>
-        <p:nvPr/>
-      </p:nvGrpSpPr>
-      <p:grpSpPr>
-        <a:xfrm>
-          <a:off x="0" y="0"/>
-          <a:ext cx="0" cy="0"/>
-          <a:chOff x="0" y="0"/>
-          <a:chExt cx="0" cy="0"/>
-        </a:xfrm>
-      </p:grpSpPr>
-      <p:sp>
-        <p:nvSpPr>
-          <p:cNvPr id="2" name="Content Placeholder 1"/>
-          <p:cNvSpPr>
-            <a:spLocks noGrp="1"/>
-          </p:cNvSpPr>
-          <p:nvPr>
-            <p:ph sz="quarter" idx="13"/>
-          </p:nvPr>
-        </p:nvSpPr>
-        <p:spPr/>
-        <p:txBody>
-          <a:bodyPr>
-            <a:normAutofit fontScale="77500" lnSpcReduction="20000"/>
-          </a:bodyPr>
-          <a:lstStyle/>
-          <a:p>
-            <a:r>
-              <a:rPr lang="en-US" sz="4000" dirty="0">
-                <a:latin typeface="Arial" panose="020B0604020202020204" pitchFamily="34" charset="0"/>
-                <a:cs typeface="Arial" panose="020B0604020202020204" pitchFamily="34" charset="0"/>
-              </a:rPr>
-              <a:t>In comparison to the current system where patients have to schedule consults, drive up to their doctor’s office, and let the doctor do the measurements, the patients could do whatever measurements is necessary with the right steps provided and then upload that data to the app. That way, the doctor can look at the specific patient if necessary or simply not do anything and let the automatically generated results take care of the patient.</a:t>
-            </a:r>
-          </a:p>
-          <a:p>
-            <a:endParaRPr lang="en-US" dirty="0"/>
-          </a:p>
-        </p:txBody>
-      </p:sp>
-      <p:sp>
-        <p:nvSpPr>
-          <p:cNvPr id="3" name="Title 2"/>
-          <p:cNvSpPr>
-            <a:spLocks noGrp="1"/>
-          </p:cNvSpPr>
-          <p:nvPr>
-            <p:ph type="title"/>
-          </p:nvPr>
-        </p:nvSpPr>
-        <p:spPr/>
-        <p:txBody>
-          <a:bodyPr>
-            <a:scene3d>
-              <a:camera prst="orthographicFront"/>
-              <a:lightRig rig="soft" dir="tl">
-                <a:rot lat="0" lon="0" rev="0"/>
-              </a:lightRig>
-            </a:scene3d>
-            <a:sp3d contourW="25400" prstMaterial="matte">
-              <a:bevelT w="25400" h="55880" prst="artDeco"/>
-              <a:contourClr>
-                <a:schemeClr val="accent2">
-                  <a:tint val="20000"/>
-                </a:schemeClr>
-              </a:contourClr>
-            </a:sp3d>
-          </a:bodyPr>
-          <a:lstStyle/>
-          <a:p>
-            <a:pPr algn="ctr"/>
-            <a:r>
-              <a:rPr lang="en-US" b="1" spc="50" dirty="0">
-                <a:ln w="11430"/>
-                <a:gradFill>
-                  <a:gsLst>
-                    <a:gs pos="25000">
-                      <a:schemeClr val="accent2">
-                        <a:satMod val="155000"/>
-                      </a:schemeClr>
-                    </a:gs>
-                    <a:gs pos="100000">
-                      <a:schemeClr val="accent2">
-                        <a:shade val="45000"/>
-                        <a:satMod val="165000"/>
-                      </a:schemeClr>
-                    </a:gs>
-                  </a:gsLst>
-                  <a:lin ang="5400000"/>
-                </a:gradFill>
-                <a:effectLst>
-                  <a:outerShdw blurRad="76200" dist="50800" dir="5400000" algn="tl" rotWithShape="0">
-                    <a:srgbClr val="000000">
-                      <a:alpha val="65000"/>
-                    </a:srgbClr>
-                  </a:outerShdw>
-                </a:effectLst>
-                <a:latin typeface="Baskerville Old Face" panose="02020602080505020303" pitchFamily="18" charset="0"/>
-              </a:rPr>
-              <a:t>About the </a:t>
-            </a:r>
-            <a:r>
-              <a:rPr lang="en-US" b="1" spc="50" dirty="0" smtClean="0">
-                <a:ln w="11430"/>
-                <a:gradFill>
-                  <a:gsLst>
-                    <a:gs pos="25000">
-                      <a:schemeClr val="accent2">
-                        <a:satMod val="155000"/>
-                      </a:schemeClr>
-                    </a:gs>
-                    <a:gs pos="100000">
-                      <a:schemeClr val="accent2">
-                        <a:shade val="45000"/>
-                        <a:satMod val="165000"/>
-                      </a:schemeClr>
-                    </a:gs>
-                  </a:gsLst>
-                  <a:lin ang="5400000"/>
-                </a:gradFill>
-                <a:effectLst>
-                  <a:outerShdw blurRad="76200" dist="50800" dir="5400000" algn="tl" rotWithShape="0">
-                    <a:srgbClr val="000000">
-                      <a:alpha val="65000"/>
-                    </a:srgbClr>
-                  </a:outerShdw>
-                </a:effectLst>
-                <a:latin typeface="Baskerville Old Face" panose="02020602080505020303" pitchFamily="18" charset="0"/>
-              </a:rPr>
-              <a:t>App Cont. </a:t>
-            </a:r>
-            <a:endParaRPr lang="en-US" b="1" spc="50" dirty="0">
-              <a:ln w="11430"/>
-              <a:gradFill>
-                <a:gsLst>
-                  <a:gs pos="25000">
-                    <a:schemeClr val="accent2">
-                      <a:satMod val="155000"/>
-                    </a:schemeClr>
-                  </a:gs>
-                  <a:gs pos="100000">
-                    <a:schemeClr val="accent2">
-                      <a:shade val="45000"/>
-                      <a:satMod val="165000"/>
-                    </a:schemeClr>
-                  </a:gs>
-                </a:gsLst>
-                <a:lin ang="5400000"/>
-              </a:gradFill>
-              <a:effectLst>
-                <a:outerShdw blurRad="76200" dist="50800" dir="5400000" algn="tl" rotWithShape="0">
-                  <a:srgbClr val="000000">
-                    <a:alpha val="65000"/>
-                  </a:srgbClr>
-                </a:outerShdw>
-              </a:effectLst>
-            </a:endParaRPr>
-          </a:p>
-        </p:txBody>
-      </p:sp>
-    </p:spTree>
-    <p:extLst>
-      <p:ext uri="{BB962C8B-B14F-4D97-AF65-F5344CB8AC3E}">
-        <p14:creationId xmlns:p14="http://schemas.microsoft.com/office/powerpoint/2010/main" val="2840072533"/>
-      </p:ext>
-    </p:extLst>
-  </p:cSld>
-  <p:clrMapOvr>
-    <a:masterClrMapping/>
-  </p:clrMapOvr>
-</p:sld>
-</file>
-
-<file path=ppt/slides/slide6.xml><?xml version="1.0" encoding="utf-8"?>
-<p:sld xmlns:a="http://schemas.openxmlformats.org/drawingml/2006/main" xmlns:r="http://schemas.openxmlformats.org/officeDocument/2006/relationships" xmlns:p="http://schemas.openxmlformats.org/presentationml/2006/main">
-  <p:cSld>
-    <p:spTree>
-      <p:nvGrpSpPr>
-        <p:cNvPr id="1" name=""/>
-        <p:cNvGrpSpPr/>
-        <p:nvPr/>
-      </p:nvGrpSpPr>
-      <p:grpSpPr>
-        <a:xfrm>
-          <a:off x="0" y="0"/>
-          <a:ext cx="0" cy="0"/>
-          <a:chOff x="0" y="0"/>
-          <a:chExt cx="0" cy="0"/>
-        </a:xfrm>
-      </p:grpSpPr>
-      <p:sp>
-        <p:nvSpPr>
-          <p:cNvPr id="4" name="Title 3"/>
-          <p:cNvSpPr>
-            <a:spLocks noGrp="1"/>
-          </p:cNvSpPr>
-          <p:nvPr>
-            <p:ph type="title"/>
-          </p:nvPr>
-        </p:nvSpPr>
-        <p:spPr>
-          <a:xfrm>
-            <a:off x="762000" y="1676400"/>
-            <a:ext cx="7680960" cy="3609109"/>
-          </a:xfrm>
-        </p:spPr>
-        <p:txBody>
-          <a:bodyPr>
-            <a:noAutofit/>
-            <a:scene3d>
-              <a:camera prst="orthographicFront"/>
-              <a:lightRig rig="soft" dir="tl">
-                <a:rot lat="0" lon="0" rev="0"/>
-              </a:lightRig>
-            </a:scene3d>
-            <a:sp3d contourW="25400" prstMaterial="matte">
-              <a:bevelT w="25400" h="55880" prst="artDeco"/>
-              <a:contourClr>
-                <a:schemeClr val="accent2">
-                  <a:tint val="20000"/>
-                </a:schemeClr>
-              </a:contourClr>
-            </a:sp3d>
-          </a:bodyPr>
-          <a:lstStyle/>
-          <a:p>
-            <a:pPr algn="ctr"/>
-            <a:r>
-              <a:rPr lang="en-US" sz="8000" b="1" spc="50" dirty="0" smtClean="0">
-                <a:ln w="11430"/>
-                <a:gradFill>
-                  <a:gsLst>
-                    <a:gs pos="25000">
-                      <a:schemeClr val="accent2">
-                        <a:satMod val="155000"/>
-                      </a:schemeClr>
-                    </a:gs>
-                    <a:gs pos="100000">
-                      <a:schemeClr val="accent2">
-                        <a:shade val="45000"/>
-                        <a:satMod val="165000"/>
-                      </a:schemeClr>
-                    </a:gs>
-                  </a:gsLst>
-                  <a:lin ang="5400000"/>
-                </a:gradFill>
-                <a:effectLst>
-                  <a:outerShdw blurRad="76200" dist="50800" dir="5400000" algn="tl" rotWithShape="0">
-                    <a:srgbClr val="000000">
-                      <a:alpha val="65000"/>
-                    </a:srgbClr>
-                  </a:outerShdw>
-                </a:effectLst>
-                <a:latin typeface="Baskerville Old Face" panose="02020602080505020303" pitchFamily="18" charset="0"/>
-              </a:rPr>
-              <a:t>Illustration of the Prostate Cancer Management App</a:t>
-            </a:r>
-            <a:endParaRPr lang="en-US" sz="8000" b="1" spc="50" dirty="0">
-              <a:ln w="11430"/>
-              <a:gradFill>
-                <a:gsLst>
-                  <a:gs pos="25000">
-                    <a:schemeClr val="accent2">
-                      <a:satMod val="155000"/>
-                    </a:schemeClr>
-                  </a:gs>
-                  <a:gs pos="100000">
-                    <a:schemeClr val="accent2">
-                      <a:shade val="45000"/>
-                      <a:satMod val="165000"/>
-                    </a:schemeClr>
-                  </a:gs>
-                </a:gsLst>
-                <a:lin ang="5400000"/>
-              </a:gradFill>
-              <a:effectLst>
-                <a:outerShdw blurRad="76200" dist="50800" dir="5400000" algn="tl" rotWithShape="0">
-                  <a:srgbClr val="000000">
-                    <a:alpha val="65000"/>
-                  </a:srgbClr>
-                </a:outerShdw>
-              </a:effectLst>
-              <a:latin typeface="Baskerville Old Face" panose="02020602080505020303" pitchFamily="18" charset="0"/>
-            </a:endParaRPr>
-          </a:p>
-        </p:txBody>
-      </p:sp>
-    </p:spTree>
-    <p:extLst>
-      <p:ext uri="{BB962C8B-B14F-4D97-AF65-F5344CB8AC3E}">
-        <p14:creationId xmlns:p14="http://schemas.microsoft.com/office/powerpoint/2010/main" val="3552793277"/>
-      </p:ext>
-    </p:extLst>
-  </p:cSld>
-  <p:clrMapOvr>
-    <a:masterClrMapping/>
-  </p:clrMapOvr>
-</p:sld>
-</file>
-
-<file path=ppt/slides/slide7.xml><?xml version="1.0" encoding="utf-8"?>
+<file path=ppt/slides/slide10.xml><?xml version="1.0" encoding="utf-8"?>
 <p:sld xmlns:a="http://schemas.openxmlformats.org/drawingml/2006/main" xmlns:r="http://schemas.openxmlformats.org/officeDocument/2006/relationships" xmlns:p="http://schemas.openxmlformats.org/presentationml/2006/main">
   <p:cSld>
     <p:spTree>
@@ -5842,7 +5198,7 @@
 </p:sld>
 </file>
 
-<file path=ppt/slides/slide8.xml><?xml version="1.0" encoding="utf-8"?>
+<file path=ppt/slides/slide11.xml><?xml version="1.0" encoding="utf-8"?>
 <p:sld xmlns:a="http://schemas.openxmlformats.org/drawingml/2006/main" xmlns:r="http://schemas.openxmlformats.org/officeDocument/2006/relationships" xmlns:p="http://schemas.openxmlformats.org/presentationml/2006/main">
   <p:cSld>
     <p:spTree>
@@ -6085,6 +5441,1783 @@
     <p:extLst>
       <p:ext uri="{BB962C8B-B14F-4D97-AF65-F5344CB8AC3E}">
         <p14:creationId xmlns:p14="http://schemas.microsoft.com/office/powerpoint/2010/main" val="625376324"/>
+      </p:ext>
+    </p:extLst>
+  </p:cSld>
+  <p:clrMapOvr>
+    <a:masterClrMapping/>
+  </p:clrMapOvr>
+</p:sld>
+</file>
+
+<file path=ppt/slides/slide12.xml><?xml version="1.0" encoding="utf-8"?>
+<p:sld xmlns:a="http://schemas.openxmlformats.org/drawingml/2006/main" xmlns:r="http://schemas.openxmlformats.org/officeDocument/2006/relationships" xmlns:p="http://schemas.openxmlformats.org/presentationml/2006/main">
+  <p:cSld>
+    <p:spTree>
+      <p:nvGrpSpPr>
+        <p:cNvPr id="1" name=""/>
+        <p:cNvGrpSpPr/>
+        <p:nvPr/>
+      </p:nvGrpSpPr>
+      <p:grpSpPr>
+        <a:xfrm>
+          <a:off x="0" y="0"/>
+          <a:ext cx="0" cy="0"/>
+          <a:chOff x="0" y="0"/>
+          <a:chExt cx="0" cy="0"/>
+        </a:xfrm>
+      </p:grpSpPr>
+      <p:sp>
+        <p:nvSpPr>
+          <p:cNvPr id="2" name="Title 1"/>
+          <p:cNvSpPr>
+            <a:spLocks noGrp="1"/>
+          </p:cNvSpPr>
+          <p:nvPr>
+            <p:ph type="title"/>
+          </p:nvPr>
+        </p:nvSpPr>
+        <p:spPr/>
+        <p:txBody>
+          <a:bodyPr>
+            <a:scene3d>
+              <a:camera prst="orthographicFront"/>
+              <a:lightRig rig="soft" dir="tl">
+                <a:rot lat="0" lon="0" rev="0"/>
+              </a:lightRig>
+            </a:scene3d>
+            <a:sp3d contourW="25400" prstMaterial="matte">
+              <a:bevelT w="25400" h="55880" prst="artDeco"/>
+              <a:contourClr>
+                <a:schemeClr val="accent2">
+                  <a:tint val="20000"/>
+                </a:schemeClr>
+              </a:contourClr>
+            </a:sp3d>
+          </a:bodyPr>
+          <a:lstStyle/>
+          <a:p>
+            <a:pPr algn="ctr"/>
+            <a:r>
+              <a:rPr lang="en-US" b="1" spc="50" dirty="0" smtClean="0">
+                <a:ln w="11430"/>
+                <a:gradFill>
+                  <a:gsLst>
+                    <a:gs pos="25000">
+                      <a:schemeClr val="accent2">
+                        <a:satMod val="155000"/>
+                      </a:schemeClr>
+                    </a:gs>
+                    <a:gs pos="100000">
+                      <a:schemeClr val="accent2">
+                        <a:shade val="45000"/>
+                        <a:satMod val="165000"/>
+                      </a:schemeClr>
+                    </a:gs>
+                  </a:gsLst>
+                  <a:lin ang="5400000"/>
+                </a:gradFill>
+                <a:effectLst>
+                  <a:outerShdw blurRad="76200" dist="50800" dir="5400000" algn="tl" rotWithShape="0">
+                    <a:srgbClr val="000000">
+                      <a:alpha val="65000"/>
+                    </a:srgbClr>
+                  </a:outerShdw>
+                </a:effectLst>
+                <a:latin typeface="Baskerville Old Face" panose="02020602080505020303" pitchFamily="18" charset="0"/>
+              </a:rPr>
+              <a:t>Reference </a:t>
+            </a:r>
+            <a:endParaRPr lang="en-US" b="1" spc="50" dirty="0">
+              <a:ln w="11430"/>
+              <a:gradFill>
+                <a:gsLst>
+                  <a:gs pos="25000">
+                    <a:schemeClr val="accent2">
+                      <a:satMod val="155000"/>
+                    </a:schemeClr>
+                  </a:gs>
+                  <a:gs pos="100000">
+                    <a:schemeClr val="accent2">
+                      <a:shade val="45000"/>
+                      <a:satMod val="165000"/>
+                    </a:schemeClr>
+                  </a:gs>
+                </a:gsLst>
+                <a:lin ang="5400000"/>
+              </a:gradFill>
+              <a:effectLst>
+                <a:outerShdw blurRad="76200" dist="50800" dir="5400000" algn="tl" rotWithShape="0">
+                  <a:srgbClr val="000000">
+                    <a:alpha val="65000"/>
+                  </a:srgbClr>
+                </a:outerShdw>
+              </a:effectLst>
+              <a:latin typeface="Baskerville Old Face" panose="02020602080505020303" pitchFamily="18" charset="0"/>
+            </a:endParaRPr>
+          </a:p>
+        </p:txBody>
+      </p:sp>
+      <p:sp>
+        <p:nvSpPr>
+          <p:cNvPr id="3" name="TextBox 2"/>
+          <p:cNvSpPr txBox="1"/>
+          <p:nvPr/>
+        </p:nvSpPr>
+        <p:spPr>
+          <a:xfrm>
+            <a:off x="457200" y="1828800"/>
+            <a:ext cx="7620000" cy="905633"/>
+          </a:xfrm>
+          <a:prstGeom prst="rect">
+            <a:avLst/>
+          </a:prstGeom>
+          <a:noFill/>
+        </p:spPr>
+        <p:txBody>
+          <a:bodyPr wrap="square" rtlCol="0">
+            <a:spAutoFit/>
+          </a:bodyPr>
+          <a:lstStyle/>
+          <a:p>
+            <a:pPr marL="457200" marR="0" indent="-457200">
+              <a:lnSpc>
+                <a:spcPct val="115000"/>
+              </a:lnSpc>
+              <a:spcBef>
+                <a:spcPts val="0"/>
+              </a:spcBef>
+              <a:spcAft>
+                <a:spcPts val="1000"/>
+              </a:spcAft>
+            </a:pPr>
+            <a:r>
+              <a:rPr lang="en-US" sz="2400" dirty="0">
+                <a:latin typeface="Arial" panose="020B0604020202020204" pitchFamily="34" charset="0"/>
+                <a:ea typeface="Calibri"/>
+                <a:cs typeface="Arial" panose="020B0604020202020204" pitchFamily="34" charset="0"/>
+              </a:rPr>
+              <a:t>Nordqvist, C. (2016, May 11). </a:t>
+            </a:r>
+            <a:r>
+              <a:rPr lang="en-US" sz="2400" i="1" dirty="0">
+                <a:latin typeface="Arial" panose="020B0604020202020204" pitchFamily="34" charset="0"/>
+                <a:ea typeface="Calibri"/>
+                <a:cs typeface="Arial" panose="020B0604020202020204" pitchFamily="34" charset="0"/>
+              </a:rPr>
+              <a:t>Prostate Cancer.</a:t>
+            </a:r>
+            <a:r>
+              <a:rPr lang="en-US" sz="2400" dirty="0">
+                <a:latin typeface="Arial" panose="020B0604020202020204" pitchFamily="34" charset="0"/>
+                <a:ea typeface="Calibri"/>
+                <a:cs typeface="Arial" panose="020B0604020202020204" pitchFamily="34" charset="0"/>
+              </a:rPr>
+              <a:t> Retrieved from Medical News Today.</a:t>
+            </a:r>
+            <a:endParaRPr lang="en-US" sz="2400" dirty="0">
+              <a:effectLst/>
+              <a:latin typeface="Arial" panose="020B0604020202020204" pitchFamily="34" charset="0"/>
+              <a:ea typeface="Calibri"/>
+              <a:cs typeface="Arial" panose="020B0604020202020204" pitchFamily="34" charset="0"/>
+            </a:endParaRPr>
+          </a:p>
+        </p:txBody>
+      </p:sp>
+    </p:spTree>
+    <p:extLst>
+      <p:ext uri="{BB962C8B-B14F-4D97-AF65-F5344CB8AC3E}">
+        <p14:creationId xmlns:p14="http://schemas.microsoft.com/office/powerpoint/2010/main" val="1904505478"/>
+      </p:ext>
+    </p:extLst>
+  </p:cSld>
+  <p:clrMapOvr>
+    <a:masterClrMapping/>
+  </p:clrMapOvr>
+</p:sld>
+</file>
+
+<file path=ppt/slides/slide2.xml><?xml version="1.0" encoding="utf-8"?>
+<p:sld xmlns:a="http://schemas.openxmlformats.org/drawingml/2006/main" xmlns:r="http://schemas.openxmlformats.org/officeDocument/2006/relationships" xmlns:p="http://schemas.openxmlformats.org/presentationml/2006/main">
+  <p:cSld>
+    <p:spTree>
+      <p:nvGrpSpPr>
+        <p:cNvPr id="1" name=""/>
+        <p:cNvGrpSpPr/>
+        <p:nvPr/>
+      </p:nvGrpSpPr>
+      <p:grpSpPr>
+        <a:xfrm>
+          <a:off x="0" y="0"/>
+          <a:ext cx="0" cy="0"/>
+          <a:chOff x="0" y="0"/>
+          <a:chExt cx="0" cy="0"/>
+        </a:xfrm>
+      </p:grpSpPr>
+      <p:sp>
+        <p:nvSpPr>
+          <p:cNvPr id="2" name="Content Placeholder 1"/>
+          <p:cNvSpPr>
+            <a:spLocks noGrp="1"/>
+          </p:cNvSpPr>
+          <p:nvPr>
+            <p:ph sz="quarter" idx="13"/>
+          </p:nvPr>
+        </p:nvSpPr>
+        <p:spPr/>
+        <p:txBody>
+          <a:bodyPr>
+            <a:normAutofit/>
+          </a:bodyPr>
+          <a:lstStyle/>
+          <a:p>
+            <a:pPr algn="ctr"/>
+            <a:r>
+              <a:rPr lang="en-US" sz="3100" dirty="0" smtClean="0">
+                <a:latin typeface="Arial" panose="020B0604020202020204" pitchFamily="34" charset="0"/>
+                <a:cs typeface="Arial" panose="020B0604020202020204" pitchFamily="34" charset="0"/>
+              </a:rPr>
+              <a:t>The </a:t>
+            </a:r>
+            <a:r>
+              <a:rPr lang="en-US" sz="3100" dirty="0">
+                <a:latin typeface="Arial" panose="020B0604020202020204" pitchFamily="34" charset="0"/>
+                <a:cs typeface="Arial" panose="020B0604020202020204" pitchFamily="34" charset="0"/>
+              </a:rPr>
+              <a:t>prostate is a gland in the male reproductive system. It makes most of the semen that carries sperm. The walnut-sized gland is located beneath the bladder and surrounds the upper part of the urethra, the tube that carries urine from the bladder.</a:t>
+            </a:r>
+          </a:p>
+        </p:txBody>
+      </p:sp>
+      <p:sp>
+        <p:nvSpPr>
+          <p:cNvPr id="3" name="Title 2"/>
+          <p:cNvSpPr>
+            <a:spLocks noGrp="1"/>
+          </p:cNvSpPr>
+          <p:nvPr>
+            <p:ph type="title"/>
+          </p:nvPr>
+        </p:nvSpPr>
+        <p:spPr>
+          <a:noFill/>
+        </p:spPr>
+        <p:txBody>
+          <a:bodyPr>
+            <a:scene3d>
+              <a:camera prst="orthographicFront"/>
+              <a:lightRig rig="soft" dir="tl">
+                <a:rot lat="0" lon="0" rev="0"/>
+              </a:lightRig>
+            </a:scene3d>
+            <a:sp3d contourW="25400" prstMaterial="matte">
+              <a:bevelT w="25400" h="55880" prst="artDeco"/>
+              <a:contourClr>
+                <a:schemeClr val="accent2">
+                  <a:tint val="20000"/>
+                </a:schemeClr>
+              </a:contourClr>
+            </a:sp3d>
+          </a:bodyPr>
+          <a:lstStyle/>
+          <a:p>
+            <a:pPr algn="ctr"/>
+            <a:r>
+              <a:rPr lang="en-US" b="1" spc="50" dirty="0" smtClean="0">
+                <a:ln w="11430"/>
+                <a:gradFill>
+                  <a:gsLst>
+                    <a:gs pos="25000">
+                      <a:schemeClr val="accent2">
+                        <a:satMod val="155000"/>
+                      </a:schemeClr>
+                    </a:gs>
+                    <a:gs pos="100000">
+                      <a:schemeClr val="accent2">
+                        <a:shade val="45000"/>
+                        <a:satMod val="165000"/>
+                      </a:schemeClr>
+                    </a:gs>
+                  </a:gsLst>
+                  <a:lin ang="5400000"/>
+                </a:gradFill>
+                <a:effectLst>
+                  <a:outerShdw blurRad="76200" dist="50800" dir="5400000" algn="tl" rotWithShape="0">
+                    <a:srgbClr val="000000">
+                      <a:alpha val="65000"/>
+                    </a:srgbClr>
+                  </a:outerShdw>
+                </a:effectLst>
+                <a:latin typeface="Baskerville Old Face" panose="02020602080505020303" pitchFamily="18" charset="0"/>
+              </a:rPr>
+              <a:t>What is Prostate?</a:t>
+            </a:r>
+            <a:endParaRPr lang="en-US" b="1" spc="50" dirty="0">
+              <a:ln w="11430"/>
+              <a:gradFill>
+                <a:gsLst>
+                  <a:gs pos="25000">
+                    <a:schemeClr val="accent2">
+                      <a:satMod val="155000"/>
+                    </a:schemeClr>
+                  </a:gs>
+                  <a:gs pos="100000">
+                    <a:schemeClr val="accent2">
+                      <a:shade val="45000"/>
+                      <a:satMod val="165000"/>
+                    </a:schemeClr>
+                  </a:gs>
+                </a:gsLst>
+                <a:lin ang="5400000"/>
+              </a:gradFill>
+              <a:effectLst>
+                <a:outerShdw blurRad="76200" dist="50800" dir="5400000" algn="tl" rotWithShape="0">
+                  <a:srgbClr val="000000">
+                    <a:alpha val="65000"/>
+                  </a:srgbClr>
+                </a:outerShdw>
+              </a:effectLst>
+              <a:latin typeface="Baskerville Old Face" panose="02020602080505020303" pitchFamily="18" charset="0"/>
+            </a:endParaRPr>
+          </a:p>
+        </p:txBody>
+      </p:sp>
+    </p:spTree>
+    <p:extLst>
+      <p:ext uri="{BB962C8B-B14F-4D97-AF65-F5344CB8AC3E}">
+        <p14:creationId xmlns:p14="http://schemas.microsoft.com/office/powerpoint/2010/main" val="812896615"/>
+      </p:ext>
+    </p:extLst>
+  </p:cSld>
+  <p:clrMapOvr>
+    <a:masterClrMapping/>
+  </p:clrMapOvr>
+</p:sld>
+</file>
+
+<file path=ppt/slides/slide3.xml><?xml version="1.0" encoding="utf-8"?>
+<p:sld xmlns:a="http://schemas.openxmlformats.org/drawingml/2006/main" xmlns:r="http://schemas.openxmlformats.org/officeDocument/2006/relationships" xmlns:p="http://schemas.openxmlformats.org/presentationml/2006/main">
+  <p:cSld>
+    <p:spTree>
+      <p:nvGrpSpPr>
+        <p:cNvPr id="1" name=""/>
+        <p:cNvGrpSpPr/>
+        <p:nvPr/>
+      </p:nvGrpSpPr>
+      <p:grpSpPr>
+        <a:xfrm>
+          <a:off x="0" y="0"/>
+          <a:ext cx="0" cy="0"/>
+          <a:chOff x="0" y="0"/>
+          <a:chExt cx="0" cy="0"/>
+        </a:xfrm>
+      </p:grpSpPr>
+      <p:pic>
+        <p:nvPicPr>
+          <p:cNvPr id="4" name="Picture 3"/>
+          <p:cNvPicPr>
+            <a:picLocks noChangeAspect="1"/>
+          </p:cNvPicPr>
+          <p:nvPr/>
+        </p:nvPicPr>
+        <p:blipFill>
+          <a:blip r:embed="rId2">
+            <a:extLst>
+              <a:ext uri="{28A0092B-C50C-407E-A947-70E740481C1C}">
+                <a14:useLocalDpi xmlns:a14="http://schemas.microsoft.com/office/drawing/2010/main" val="0"/>
+              </a:ext>
+            </a:extLst>
+          </a:blip>
+          <a:stretch>
+            <a:fillRect/>
+          </a:stretch>
+        </p:blipFill>
+        <p:spPr>
+          <a:xfrm>
+            <a:off x="4419600" y="4381119"/>
+            <a:ext cx="4724400" cy="2476881"/>
+          </a:xfrm>
+          <a:prstGeom prst="rect">
+            <a:avLst/>
+          </a:prstGeom>
+          <a:ln>
+            <a:noFill/>
+          </a:ln>
+          <a:effectLst>
+            <a:softEdge rad="112500"/>
+          </a:effectLst>
+        </p:spPr>
+      </p:pic>
+      <p:sp>
+        <p:nvSpPr>
+          <p:cNvPr id="2" name="Content Placeholder 1"/>
+          <p:cNvSpPr>
+            <a:spLocks noGrp="1"/>
+          </p:cNvSpPr>
+          <p:nvPr>
+            <p:ph sz="quarter" idx="13"/>
+          </p:nvPr>
+        </p:nvSpPr>
+        <p:spPr>
+          <a:xfrm>
+            <a:off x="381000" y="1447800"/>
+            <a:ext cx="7680960" cy="4587240"/>
+          </a:xfrm>
+        </p:spPr>
+        <p:txBody>
+          <a:bodyPr/>
+          <a:lstStyle/>
+          <a:p>
+            <a:pPr marL="457200" indent="-457200">
+              <a:buFont typeface="Arial" panose="020B0604020202020204" pitchFamily="34" charset="0"/>
+              <a:buChar char="•"/>
+            </a:pPr>
+            <a:r>
+              <a:rPr lang="en-US" sz="2800" dirty="0" smtClean="0">
+                <a:latin typeface="Arial" panose="020B0604020202020204" pitchFamily="34" charset="0"/>
+                <a:cs typeface="Arial" panose="020B0604020202020204" pitchFamily="34" charset="0"/>
+              </a:rPr>
+              <a:t>Cancer </a:t>
+            </a:r>
+            <a:r>
+              <a:rPr lang="en-US" sz="2800" dirty="0">
+                <a:latin typeface="Arial" panose="020B0604020202020204" pitchFamily="34" charset="0"/>
+                <a:cs typeface="Arial" panose="020B0604020202020204" pitchFamily="34" charset="0"/>
+              </a:rPr>
+              <a:t>is the growth of abnormal cells. </a:t>
+            </a:r>
+            <a:endParaRPr lang="en-US" sz="2800" dirty="0" smtClean="0">
+              <a:latin typeface="Arial" panose="020B0604020202020204" pitchFamily="34" charset="0"/>
+              <a:cs typeface="Arial" panose="020B0604020202020204" pitchFamily="34" charset="0"/>
+            </a:endParaRPr>
+          </a:p>
+          <a:p>
+            <a:pPr marL="457200" indent="-457200">
+              <a:buFont typeface="Arial" panose="020B0604020202020204" pitchFamily="34" charset="0"/>
+              <a:buChar char="•"/>
+            </a:pPr>
+            <a:r>
+              <a:rPr lang="en-US" sz="2800" dirty="0" smtClean="0">
+                <a:latin typeface="Arial" panose="020B0604020202020204" pitchFamily="34" charset="0"/>
+                <a:cs typeface="Arial" panose="020B0604020202020204" pitchFamily="34" charset="0"/>
+              </a:rPr>
+              <a:t>Cancer </a:t>
+            </a:r>
+            <a:r>
+              <a:rPr lang="en-US" sz="2800" dirty="0">
+                <a:latin typeface="Arial" panose="020B0604020202020204" pitchFamily="34" charset="0"/>
+                <a:cs typeface="Arial" panose="020B0604020202020204" pitchFamily="34" charset="0"/>
+              </a:rPr>
+              <a:t>cells can invade and damage normal tissue. </a:t>
+            </a:r>
+            <a:endParaRPr lang="en-US" sz="2800" dirty="0" smtClean="0">
+              <a:latin typeface="Arial" panose="020B0604020202020204" pitchFamily="34" charset="0"/>
+              <a:cs typeface="Arial" panose="020B0604020202020204" pitchFamily="34" charset="0"/>
+            </a:endParaRPr>
+          </a:p>
+          <a:p>
+            <a:pPr marL="457200" indent="-457200">
+              <a:buFont typeface="Arial" panose="020B0604020202020204" pitchFamily="34" charset="0"/>
+              <a:buChar char="•"/>
+            </a:pPr>
+            <a:r>
+              <a:rPr lang="en-US" sz="2800" dirty="0" smtClean="0">
+                <a:latin typeface="Arial" panose="020B0604020202020204" pitchFamily="34" charset="0"/>
+                <a:cs typeface="Arial" panose="020B0604020202020204" pitchFamily="34" charset="0"/>
+              </a:rPr>
+              <a:t>Prostate </a:t>
+            </a:r>
+            <a:r>
+              <a:rPr lang="en-US" sz="2800" dirty="0">
+                <a:latin typeface="Arial" panose="020B0604020202020204" pitchFamily="34" charset="0"/>
+                <a:cs typeface="Arial" panose="020B0604020202020204" pitchFamily="34" charset="0"/>
+              </a:rPr>
+              <a:t>cancer starts in the cells of the prostate. </a:t>
+            </a:r>
+            <a:endParaRPr lang="en-US" sz="2800" dirty="0" smtClean="0">
+              <a:latin typeface="Arial" panose="020B0604020202020204" pitchFamily="34" charset="0"/>
+              <a:cs typeface="Arial" panose="020B0604020202020204" pitchFamily="34" charset="0"/>
+            </a:endParaRPr>
+          </a:p>
+          <a:p>
+            <a:pPr marL="457200" indent="-457200">
+              <a:buFont typeface="Arial" panose="020B0604020202020204" pitchFamily="34" charset="0"/>
+              <a:buChar char="•"/>
+            </a:pPr>
+            <a:r>
+              <a:rPr lang="en-US" sz="2800" dirty="0" smtClean="0">
+                <a:latin typeface="Arial" panose="020B0604020202020204" pitchFamily="34" charset="0"/>
+                <a:cs typeface="Arial" panose="020B0604020202020204" pitchFamily="34" charset="0"/>
+              </a:rPr>
+              <a:t>Some </a:t>
+            </a:r>
+            <a:r>
+              <a:rPr lang="en-US" sz="2800" dirty="0">
+                <a:latin typeface="Arial" panose="020B0604020202020204" pitchFamily="34" charset="0"/>
+                <a:cs typeface="Arial" panose="020B0604020202020204" pitchFamily="34" charset="0"/>
+              </a:rPr>
+              <a:t>prostate cancers can grow and spread quickly. But most of them grow slowly.</a:t>
+            </a:r>
+          </a:p>
+        </p:txBody>
+      </p:sp>
+      <p:sp>
+        <p:nvSpPr>
+          <p:cNvPr id="3" name="Title 2"/>
+          <p:cNvSpPr>
+            <a:spLocks noGrp="1"/>
+          </p:cNvSpPr>
+          <p:nvPr>
+            <p:ph type="title"/>
+          </p:nvPr>
+        </p:nvSpPr>
+        <p:spPr/>
+        <p:txBody>
+          <a:bodyPr>
+            <a:scene3d>
+              <a:camera prst="orthographicFront"/>
+              <a:lightRig rig="soft" dir="tl">
+                <a:rot lat="0" lon="0" rev="0"/>
+              </a:lightRig>
+            </a:scene3d>
+            <a:sp3d contourW="25400" prstMaterial="matte">
+              <a:bevelT w="25400" h="55880" prst="artDeco"/>
+              <a:contourClr>
+                <a:schemeClr val="accent2">
+                  <a:tint val="20000"/>
+                </a:schemeClr>
+              </a:contourClr>
+            </a:sp3d>
+          </a:bodyPr>
+          <a:lstStyle/>
+          <a:p>
+            <a:pPr algn="ctr"/>
+            <a:r>
+              <a:rPr lang="en-US" b="1" spc="50" dirty="0" smtClean="0">
+                <a:ln w="11430"/>
+                <a:gradFill>
+                  <a:gsLst>
+                    <a:gs pos="25000">
+                      <a:schemeClr val="accent2">
+                        <a:satMod val="155000"/>
+                      </a:schemeClr>
+                    </a:gs>
+                    <a:gs pos="100000">
+                      <a:schemeClr val="accent2">
+                        <a:shade val="45000"/>
+                        <a:satMod val="165000"/>
+                      </a:schemeClr>
+                    </a:gs>
+                  </a:gsLst>
+                  <a:lin ang="5400000"/>
+                </a:gradFill>
+                <a:effectLst>
+                  <a:outerShdw blurRad="76200" dist="50800" dir="5400000" algn="tl" rotWithShape="0">
+                    <a:srgbClr val="000000">
+                      <a:alpha val="65000"/>
+                    </a:srgbClr>
+                  </a:outerShdw>
+                </a:effectLst>
+                <a:latin typeface="Baskerville Old Face" panose="02020602080505020303" pitchFamily="18" charset="0"/>
+              </a:rPr>
+              <a:t> </a:t>
+            </a:r>
+            <a:r>
+              <a:rPr lang="en-US" b="1" spc="50" dirty="0">
+                <a:ln w="11430"/>
+                <a:gradFill>
+                  <a:gsLst>
+                    <a:gs pos="25000">
+                      <a:schemeClr val="accent2">
+                        <a:satMod val="155000"/>
+                      </a:schemeClr>
+                    </a:gs>
+                    <a:gs pos="100000">
+                      <a:schemeClr val="accent2">
+                        <a:shade val="45000"/>
+                        <a:satMod val="165000"/>
+                      </a:schemeClr>
+                    </a:gs>
+                  </a:gsLst>
+                  <a:lin ang="5400000"/>
+                </a:gradFill>
+                <a:effectLst>
+                  <a:outerShdw blurRad="76200" dist="50800" dir="5400000" algn="tl" rotWithShape="0">
+                    <a:srgbClr val="000000">
+                      <a:alpha val="65000"/>
+                    </a:srgbClr>
+                  </a:outerShdw>
+                </a:effectLst>
+                <a:latin typeface="Baskerville Old Face" panose="02020602080505020303" pitchFamily="18" charset="0"/>
+              </a:rPr>
+              <a:t>P</a:t>
+            </a:r>
+            <a:r>
+              <a:rPr lang="en-US" b="1" spc="50" dirty="0" smtClean="0">
+                <a:ln w="11430"/>
+                <a:gradFill>
+                  <a:gsLst>
+                    <a:gs pos="25000">
+                      <a:schemeClr val="accent2">
+                        <a:satMod val="155000"/>
+                      </a:schemeClr>
+                    </a:gs>
+                    <a:gs pos="100000">
+                      <a:schemeClr val="accent2">
+                        <a:shade val="45000"/>
+                        <a:satMod val="165000"/>
+                      </a:schemeClr>
+                    </a:gs>
+                  </a:gsLst>
+                  <a:lin ang="5400000"/>
+                </a:gradFill>
+                <a:effectLst>
+                  <a:outerShdw blurRad="76200" dist="50800" dir="5400000" algn="tl" rotWithShape="0">
+                    <a:srgbClr val="000000">
+                      <a:alpha val="65000"/>
+                    </a:srgbClr>
+                  </a:outerShdw>
+                </a:effectLst>
+                <a:latin typeface="Baskerville Old Face" panose="02020602080505020303" pitchFamily="18" charset="0"/>
+              </a:rPr>
+              <a:t>rostate cancer</a:t>
+            </a:r>
+            <a:endParaRPr lang="en-US" b="1" spc="50" dirty="0">
+              <a:ln w="11430"/>
+              <a:gradFill>
+                <a:gsLst>
+                  <a:gs pos="25000">
+                    <a:schemeClr val="accent2">
+                      <a:satMod val="155000"/>
+                    </a:schemeClr>
+                  </a:gs>
+                  <a:gs pos="100000">
+                    <a:schemeClr val="accent2">
+                      <a:shade val="45000"/>
+                      <a:satMod val="165000"/>
+                    </a:schemeClr>
+                  </a:gs>
+                </a:gsLst>
+                <a:lin ang="5400000"/>
+              </a:gradFill>
+              <a:effectLst>
+                <a:outerShdw blurRad="76200" dist="50800" dir="5400000" algn="tl" rotWithShape="0">
+                  <a:srgbClr val="000000">
+                    <a:alpha val="65000"/>
+                  </a:srgbClr>
+                </a:outerShdw>
+              </a:effectLst>
+              <a:latin typeface="Baskerville Old Face" panose="02020602080505020303" pitchFamily="18" charset="0"/>
+            </a:endParaRPr>
+          </a:p>
+        </p:txBody>
+      </p:sp>
+    </p:spTree>
+    <p:extLst>
+      <p:ext uri="{BB962C8B-B14F-4D97-AF65-F5344CB8AC3E}">
+        <p14:creationId xmlns:p14="http://schemas.microsoft.com/office/powerpoint/2010/main" val="1731414376"/>
+      </p:ext>
+    </p:extLst>
+  </p:cSld>
+  <p:clrMapOvr>
+    <a:masterClrMapping/>
+  </p:clrMapOvr>
+</p:sld>
+</file>
+
+<file path=ppt/slides/slide4.xml><?xml version="1.0" encoding="utf-8"?>
+<p:sld xmlns:a="http://schemas.openxmlformats.org/drawingml/2006/main" xmlns:r="http://schemas.openxmlformats.org/officeDocument/2006/relationships" xmlns:p="http://schemas.openxmlformats.org/presentationml/2006/main">
+  <p:cSld>
+    <p:spTree>
+      <p:nvGrpSpPr>
+        <p:cNvPr id="1" name=""/>
+        <p:cNvGrpSpPr/>
+        <p:nvPr/>
+      </p:nvGrpSpPr>
+      <p:grpSpPr>
+        <a:xfrm>
+          <a:off x="0" y="0"/>
+          <a:ext cx="0" cy="0"/>
+          <a:chOff x="0" y="0"/>
+          <a:chExt cx="0" cy="0"/>
+        </a:xfrm>
+      </p:grpSpPr>
+      <p:sp>
+        <p:nvSpPr>
+          <p:cNvPr id="2" name="Content Placeholder 1"/>
+          <p:cNvSpPr>
+            <a:spLocks noGrp="1"/>
+          </p:cNvSpPr>
+          <p:nvPr>
+            <p:ph sz="quarter" idx="13"/>
+          </p:nvPr>
+        </p:nvSpPr>
+        <p:spPr>
+          <a:xfrm>
+            <a:off x="609600" y="1066800"/>
+            <a:ext cx="7680960" cy="5791200"/>
+          </a:xfrm>
+        </p:spPr>
+        <p:txBody>
+          <a:bodyPr>
+            <a:noAutofit/>
+          </a:bodyPr>
+          <a:lstStyle/>
+          <a:p>
+            <a:r>
+              <a:rPr lang="en-US" sz="2100" dirty="0">
+                <a:latin typeface="Arial" panose="020B0604020202020204" pitchFamily="34" charset="0"/>
+                <a:cs typeface="Arial" panose="020B0604020202020204" pitchFamily="34" charset="0"/>
+              </a:rPr>
+              <a:t>During the early stages of prostate cancer there are usually no symptoms. Most men at this stage find out they have prostate cancer after a routine check up or blood test. When symptoms do exist, they are usually one or more of the following</a:t>
+            </a:r>
+            <a:r>
+              <a:rPr lang="en-US" sz="2100" dirty="0" smtClean="0">
+                <a:latin typeface="Arial" panose="020B0604020202020204" pitchFamily="34" charset="0"/>
+                <a:cs typeface="Arial" panose="020B0604020202020204" pitchFamily="34" charset="0"/>
+              </a:rPr>
+              <a:t>:</a:t>
+            </a:r>
+            <a:endParaRPr lang="en-US" sz="2100" dirty="0">
+              <a:latin typeface="Arial" panose="020B0604020202020204" pitchFamily="34" charset="0"/>
+              <a:cs typeface="Arial" panose="020B0604020202020204" pitchFamily="34" charset="0"/>
+            </a:endParaRPr>
+          </a:p>
+          <a:p>
+            <a:pPr marL="687388" lvl="2" indent="-342900"/>
+            <a:r>
+              <a:rPr lang="en-US" sz="2200" dirty="0" smtClean="0">
+                <a:latin typeface="Arial" panose="020B0604020202020204" pitchFamily="34" charset="0"/>
+                <a:cs typeface="Arial" panose="020B0604020202020204" pitchFamily="34" charset="0"/>
+              </a:rPr>
+              <a:t>The </a:t>
+            </a:r>
+            <a:r>
+              <a:rPr lang="en-US" sz="2200" dirty="0">
+                <a:latin typeface="Arial" panose="020B0604020202020204" pitchFamily="34" charset="0"/>
+                <a:cs typeface="Arial" panose="020B0604020202020204" pitchFamily="34" charset="0"/>
+              </a:rPr>
+              <a:t>patient urinates more often</a:t>
+            </a:r>
+          </a:p>
+          <a:p>
+            <a:pPr marL="687388" lvl="2" indent="-342900"/>
+            <a:r>
+              <a:rPr lang="en-US" sz="2200" dirty="0">
+                <a:latin typeface="Arial" panose="020B0604020202020204" pitchFamily="34" charset="0"/>
+                <a:cs typeface="Arial" panose="020B0604020202020204" pitchFamily="34" charset="0"/>
+              </a:rPr>
+              <a:t>The patient gets up at night more often to urinate</a:t>
+            </a:r>
+          </a:p>
+          <a:p>
+            <a:pPr marL="687388" lvl="2" indent="-342900"/>
+            <a:r>
+              <a:rPr lang="en-US" sz="2200" dirty="0">
+                <a:latin typeface="Arial" panose="020B0604020202020204" pitchFamily="34" charset="0"/>
+                <a:cs typeface="Arial" panose="020B0604020202020204" pitchFamily="34" charset="0"/>
+              </a:rPr>
+              <a:t>He may find it hard to start urinating</a:t>
+            </a:r>
+          </a:p>
+          <a:p>
+            <a:pPr marL="687388" lvl="2" indent="-342900"/>
+            <a:r>
+              <a:rPr lang="en-US" sz="2200" dirty="0">
+                <a:latin typeface="Arial" panose="020B0604020202020204" pitchFamily="34" charset="0"/>
+                <a:cs typeface="Arial" panose="020B0604020202020204" pitchFamily="34" charset="0"/>
+              </a:rPr>
+              <a:t>He may find it hard to keep urinating once he has started</a:t>
+            </a:r>
+          </a:p>
+          <a:p>
+            <a:pPr marL="687388" lvl="2" indent="-342900"/>
+            <a:r>
+              <a:rPr lang="en-US" sz="2200" dirty="0">
+                <a:latin typeface="Arial" panose="020B0604020202020204" pitchFamily="34" charset="0"/>
+                <a:cs typeface="Arial" panose="020B0604020202020204" pitchFamily="34" charset="0"/>
+              </a:rPr>
+              <a:t>There may be blood in the urine</a:t>
+            </a:r>
+          </a:p>
+          <a:p>
+            <a:pPr marL="687388" lvl="2" indent="-342900"/>
+            <a:r>
+              <a:rPr lang="en-US" sz="2200" dirty="0">
+                <a:latin typeface="Arial" panose="020B0604020202020204" pitchFamily="34" charset="0"/>
+                <a:cs typeface="Arial" panose="020B0604020202020204" pitchFamily="34" charset="0"/>
+              </a:rPr>
+              <a:t>Urination might be painful</a:t>
+            </a:r>
+          </a:p>
+          <a:p>
+            <a:pPr marL="687388" lvl="2" indent="-342900"/>
+            <a:r>
+              <a:rPr lang="en-US" sz="2200" dirty="0">
+                <a:latin typeface="Arial" panose="020B0604020202020204" pitchFamily="34" charset="0"/>
+                <a:cs typeface="Arial" panose="020B0604020202020204" pitchFamily="34" charset="0"/>
+              </a:rPr>
+              <a:t>Ejaculation may be painful (less common)</a:t>
+            </a:r>
+          </a:p>
+          <a:p>
+            <a:pPr marL="687388" lvl="2" indent="-342900"/>
+            <a:r>
+              <a:rPr lang="en-US" sz="2200" dirty="0">
+                <a:latin typeface="Arial" panose="020B0604020202020204" pitchFamily="34" charset="0"/>
+                <a:cs typeface="Arial" panose="020B0604020202020204" pitchFamily="34" charset="0"/>
+              </a:rPr>
+              <a:t>Achieving or maintaining an erection may be difficult (less common).</a:t>
+            </a:r>
+          </a:p>
+        </p:txBody>
+      </p:sp>
+      <p:sp>
+        <p:nvSpPr>
+          <p:cNvPr id="3" name="Title 2"/>
+          <p:cNvSpPr>
+            <a:spLocks noGrp="1"/>
+          </p:cNvSpPr>
+          <p:nvPr>
+            <p:ph type="title"/>
+          </p:nvPr>
+        </p:nvSpPr>
+        <p:spPr>
+          <a:xfrm>
+            <a:off x="381000" y="8965"/>
+            <a:ext cx="7680960" cy="1066800"/>
+          </a:xfrm>
+        </p:spPr>
+        <p:txBody>
+          <a:bodyPr anchor="ctr">
+            <a:noAutofit/>
+            <a:scene3d>
+              <a:camera prst="orthographicFront"/>
+              <a:lightRig rig="soft" dir="tl">
+                <a:rot lat="0" lon="0" rev="0"/>
+              </a:lightRig>
+            </a:scene3d>
+            <a:sp3d contourW="25400" prstMaterial="matte">
+              <a:bevelT w="25400" h="55880" prst="artDeco"/>
+              <a:contourClr>
+                <a:schemeClr val="accent2">
+                  <a:tint val="20000"/>
+                </a:schemeClr>
+              </a:contourClr>
+            </a:sp3d>
+          </a:bodyPr>
+          <a:lstStyle/>
+          <a:p>
+            <a:pPr algn="ctr">
+              <a:spcBef>
+                <a:spcPts val="600"/>
+              </a:spcBef>
+              <a:spcAft>
+                <a:spcPts val="600"/>
+              </a:spcAft>
+            </a:pPr>
+            <a:r>
+              <a:rPr lang="en-US" b="1" spc="50" dirty="0">
+                <a:ln w="11430"/>
+                <a:gradFill>
+                  <a:gsLst>
+                    <a:gs pos="25000">
+                      <a:schemeClr val="accent2">
+                        <a:satMod val="155000"/>
+                      </a:schemeClr>
+                    </a:gs>
+                    <a:gs pos="100000">
+                      <a:schemeClr val="accent2">
+                        <a:shade val="45000"/>
+                        <a:satMod val="165000"/>
+                      </a:schemeClr>
+                    </a:gs>
+                  </a:gsLst>
+                  <a:lin ang="5400000"/>
+                </a:gradFill>
+                <a:effectLst>
+                  <a:outerShdw blurRad="76200" dist="50800" dir="5400000" algn="tl" rotWithShape="0">
+                    <a:srgbClr val="000000">
+                      <a:alpha val="65000"/>
+                    </a:srgbClr>
+                  </a:outerShdw>
+                </a:effectLst>
+                <a:latin typeface="Baskerville Old Face" panose="02020602080505020303" pitchFamily="18" charset="0"/>
+              </a:rPr>
+              <a:t>Signs and symptoms of prostate cancer</a:t>
+            </a:r>
+          </a:p>
+        </p:txBody>
+      </p:sp>
+    </p:spTree>
+    <p:extLst>
+      <p:ext uri="{BB962C8B-B14F-4D97-AF65-F5344CB8AC3E}">
+        <p14:creationId xmlns:p14="http://schemas.microsoft.com/office/powerpoint/2010/main" val="1845280871"/>
+      </p:ext>
+    </p:extLst>
+  </p:cSld>
+  <p:clrMapOvr>
+    <a:masterClrMapping/>
+  </p:clrMapOvr>
+</p:sld>
+</file>
+
+<file path=ppt/slides/slide5.xml><?xml version="1.0" encoding="utf-8"?>
+<p:sld xmlns:a="http://schemas.openxmlformats.org/drawingml/2006/main" xmlns:r="http://schemas.openxmlformats.org/officeDocument/2006/relationships" xmlns:p="http://schemas.openxmlformats.org/presentationml/2006/main">
+  <p:cSld>
+    <p:spTree>
+      <p:nvGrpSpPr>
+        <p:cNvPr id="1" name=""/>
+        <p:cNvGrpSpPr/>
+        <p:nvPr/>
+      </p:nvGrpSpPr>
+      <p:grpSpPr>
+        <a:xfrm>
+          <a:off x="0" y="0"/>
+          <a:ext cx="0" cy="0"/>
+          <a:chOff x="0" y="0"/>
+          <a:chExt cx="0" cy="0"/>
+        </a:xfrm>
+      </p:grpSpPr>
+      <p:sp>
+        <p:nvSpPr>
+          <p:cNvPr id="2" name="Content Placeholder 1"/>
+          <p:cNvSpPr>
+            <a:spLocks noGrp="1"/>
+          </p:cNvSpPr>
+          <p:nvPr>
+            <p:ph sz="quarter" idx="13"/>
+          </p:nvPr>
+        </p:nvSpPr>
+        <p:spPr>
+          <a:xfrm>
+            <a:off x="533400" y="1371600"/>
+            <a:ext cx="7680960" cy="4724400"/>
+          </a:xfrm>
+        </p:spPr>
+        <p:txBody>
+          <a:bodyPr>
+            <a:normAutofit fontScale="92500" lnSpcReduction="10000"/>
+          </a:bodyPr>
+          <a:lstStyle/>
+          <a:p>
+            <a:r>
+              <a:rPr lang="en-US" sz="2400" dirty="0" smtClean="0">
+                <a:latin typeface="Arial" panose="020B0604020202020204" pitchFamily="34" charset="0"/>
+                <a:cs typeface="Arial" panose="020B0604020202020204" pitchFamily="34" charset="0"/>
+              </a:rPr>
+              <a:t>If </a:t>
+            </a:r>
+            <a:r>
+              <a:rPr lang="en-US" sz="2400" dirty="0">
+                <a:latin typeface="Arial" panose="020B0604020202020204" pitchFamily="34" charset="0"/>
+                <a:cs typeface="Arial" panose="020B0604020202020204" pitchFamily="34" charset="0"/>
+              </a:rPr>
+              <a:t>the cancer is small and contained - localized - it is usually managed by one of the following treatments:</a:t>
+            </a:r>
+          </a:p>
+          <a:p>
+            <a:pPr marL="285750" indent="-285750">
+              <a:buFont typeface="Arial" panose="020B0604020202020204" pitchFamily="34" charset="0"/>
+              <a:buChar char="•"/>
+            </a:pPr>
+            <a:r>
+              <a:rPr lang="en-US" sz="2400" dirty="0" smtClean="0">
+                <a:latin typeface="Arial" panose="020B0604020202020204" pitchFamily="34" charset="0"/>
+                <a:cs typeface="Arial" panose="020B0604020202020204" pitchFamily="34" charset="0"/>
+              </a:rPr>
+              <a:t>Watchful </a:t>
+            </a:r>
+            <a:r>
+              <a:rPr lang="en-US" sz="2400" dirty="0">
+                <a:latin typeface="Arial" panose="020B0604020202020204" pitchFamily="34" charset="0"/>
+                <a:cs typeface="Arial" panose="020B0604020202020204" pitchFamily="34" charset="0"/>
+              </a:rPr>
+              <a:t>waiting - not immediate treatment is carried out. PSA blood levels are regularly monitored.</a:t>
+            </a:r>
+          </a:p>
+          <a:p>
+            <a:pPr marL="285750" indent="-285750">
+              <a:buFont typeface="Arial" panose="020B0604020202020204" pitchFamily="34" charset="0"/>
+              <a:buChar char="•"/>
+            </a:pPr>
+            <a:r>
+              <a:rPr lang="en-US" sz="2400" dirty="0">
+                <a:latin typeface="Arial" panose="020B0604020202020204" pitchFamily="34" charset="0"/>
+                <a:cs typeface="Arial" panose="020B0604020202020204" pitchFamily="34" charset="0"/>
+              </a:rPr>
+              <a:t>Radical prostatectomy - the prostate is surgically removed.</a:t>
+            </a:r>
+          </a:p>
+          <a:p>
+            <a:pPr marL="285750" indent="-285750">
+              <a:buFont typeface="Arial" panose="020B0604020202020204" pitchFamily="34" charset="0"/>
+              <a:buChar char="•"/>
+            </a:pPr>
+            <a:r>
+              <a:rPr lang="en-US" sz="2400" dirty="0">
+                <a:latin typeface="Arial" panose="020B0604020202020204" pitchFamily="34" charset="0"/>
+                <a:cs typeface="Arial" panose="020B0604020202020204" pitchFamily="34" charset="0"/>
+              </a:rPr>
+              <a:t>Brachytherapy - radioactive seeds are implanted into the prostate.</a:t>
+            </a:r>
+          </a:p>
+          <a:p>
+            <a:pPr marL="285750" indent="-285750">
+              <a:buFont typeface="Arial" panose="020B0604020202020204" pitchFamily="34" charset="0"/>
+              <a:buChar char="•"/>
+            </a:pPr>
+            <a:r>
+              <a:rPr lang="en-US" sz="2400" dirty="0">
+                <a:latin typeface="Arial" panose="020B0604020202020204" pitchFamily="34" charset="0"/>
+                <a:cs typeface="Arial" panose="020B0604020202020204" pitchFamily="34" charset="0"/>
+              </a:rPr>
+              <a:t>Conformal radiotherapy - the radiation beams are shaped so that the region where they overlap is as close to the same shape as the organ or region that requires treatment, thus minimizing healthy tissue exposure to radiation.</a:t>
+            </a:r>
+          </a:p>
+          <a:p>
+            <a:endParaRPr lang="en-US" dirty="0"/>
+          </a:p>
+        </p:txBody>
+      </p:sp>
+      <p:sp>
+        <p:nvSpPr>
+          <p:cNvPr id="3" name="Title 2"/>
+          <p:cNvSpPr>
+            <a:spLocks noGrp="1"/>
+          </p:cNvSpPr>
+          <p:nvPr>
+            <p:ph type="title"/>
+          </p:nvPr>
+        </p:nvSpPr>
+        <p:spPr/>
+        <p:txBody>
+          <a:bodyPr anchor="ctr">
+            <a:scene3d>
+              <a:camera prst="orthographicFront"/>
+              <a:lightRig rig="soft" dir="tl">
+                <a:rot lat="0" lon="0" rev="0"/>
+              </a:lightRig>
+            </a:scene3d>
+            <a:sp3d contourW="25400" prstMaterial="matte">
+              <a:bevelT w="25400" h="55880" prst="artDeco"/>
+              <a:contourClr>
+                <a:schemeClr val="accent2">
+                  <a:tint val="20000"/>
+                </a:schemeClr>
+              </a:contourClr>
+            </a:sp3d>
+          </a:bodyPr>
+          <a:lstStyle/>
+          <a:p>
+            <a:pPr algn="ctr"/>
+            <a:r>
+              <a:rPr lang="en-US" b="1" spc="50" dirty="0">
+                <a:ln w="11430"/>
+                <a:gradFill>
+                  <a:gsLst>
+                    <a:gs pos="25000">
+                      <a:schemeClr val="accent2">
+                        <a:satMod val="155000"/>
+                      </a:schemeClr>
+                    </a:gs>
+                    <a:gs pos="100000">
+                      <a:schemeClr val="accent2">
+                        <a:shade val="45000"/>
+                        <a:satMod val="165000"/>
+                      </a:schemeClr>
+                    </a:gs>
+                  </a:gsLst>
+                  <a:lin ang="5400000"/>
+                </a:gradFill>
+                <a:effectLst>
+                  <a:outerShdw blurRad="76200" dist="50800" dir="5400000" algn="tl" rotWithShape="0">
+                    <a:srgbClr val="000000">
+                      <a:alpha val="65000"/>
+                    </a:srgbClr>
+                  </a:outerShdw>
+                </a:effectLst>
+              </a:rPr>
+              <a:t>Treatments for prostate cancer</a:t>
+            </a:r>
+          </a:p>
+        </p:txBody>
+      </p:sp>
+    </p:spTree>
+    <p:extLst>
+      <p:ext uri="{BB962C8B-B14F-4D97-AF65-F5344CB8AC3E}">
+        <p14:creationId xmlns:p14="http://schemas.microsoft.com/office/powerpoint/2010/main" val="344437710"/>
+      </p:ext>
+    </p:extLst>
+  </p:cSld>
+  <p:clrMapOvr>
+    <a:masterClrMapping/>
+  </p:clrMapOvr>
+</p:sld>
+</file>
+
+<file path=ppt/slides/slide6.xml><?xml version="1.0" encoding="utf-8"?>
+<p:sld xmlns:a="http://schemas.openxmlformats.org/drawingml/2006/main" xmlns:r="http://schemas.openxmlformats.org/officeDocument/2006/relationships" xmlns:p="http://schemas.openxmlformats.org/presentationml/2006/main">
+  <p:cSld>
+    <p:spTree>
+      <p:nvGrpSpPr>
+        <p:cNvPr id="1" name=""/>
+        <p:cNvGrpSpPr/>
+        <p:nvPr/>
+      </p:nvGrpSpPr>
+      <p:grpSpPr>
+        <a:xfrm>
+          <a:off x="0" y="0"/>
+          <a:ext cx="0" cy="0"/>
+          <a:chOff x="0" y="0"/>
+          <a:chExt cx="0" cy="0"/>
+        </a:xfrm>
+      </p:grpSpPr>
+      <p:sp>
+        <p:nvSpPr>
+          <p:cNvPr id="2" name="Content Placeholder 1"/>
+          <p:cNvSpPr>
+            <a:spLocks noGrp="1"/>
+          </p:cNvSpPr>
+          <p:nvPr>
+            <p:ph sz="quarter" idx="13"/>
+          </p:nvPr>
+        </p:nvSpPr>
+        <p:spPr/>
+        <p:txBody>
+          <a:bodyPr>
+            <a:noAutofit/>
+          </a:bodyPr>
+          <a:lstStyle/>
+          <a:p>
+            <a:pPr marL="285750" indent="-285750">
+              <a:buFont typeface="Arial" panose="020B0604020202020204" pitchFamily="34" charset="0"/>
+              <a:buChar char="•"/>
+            </a:pPr>
+            <a:r>
+              <a:rPr lang="en-US" sz="2400" dirty="0">
+                <a:latin typeface="Arial" panose="020B0604020202020204" pitchFamily="34" charset="0"/>
+                <a:cs typeface="Arial" panose="020B0604020202020204" pitchFamily="34" charset="0"/>
+              </a:rPr>
+              <a:t>Intensity modulated radiotherapy - beams with variable intensity are used. An advanced form of conformal radiotherapy usually delivered by a computer-controlled linear accelerator. </a:t>
+            </a:r>
+          </a:p>
+          <a:p>
+            <a:pPr marL="285750" indent="-285750">
+              <a:buFont typeface="Arial" panose="020B0604020202020204" pitchFamily="34" charset="0"/>
+              <a:buChar char="•"/>
+            </a:pPr>
+            <a:r>
+              <a:rPr lang="en-US" sz="2400" dirty="0">
+                <a:latin typeface="Arial" panose="020B0604020202020204" pitchFamily="34" charset="0"/>
+                <a:cs typeface="Arial" panose="020B0604020202020204" pitchFamily="34" charset="0"/>
+              </a:rPr>
+              <a:t>Treatment recommendations really depend on individual cases. In general, if there is a good prognosis and the cancer is in its early stages, all options can be considered. However, they all have their advantages and disadvantages. The patient should discuss available options thoroughly with his doctor</a:t>
+            </a:r>
+          </a:p>
+        </p:txBody>
+      </p:sp>
+      <p:sp>
+        <p:nvSpPr>
+          <p:cNvPr id="3" name="Title 2"/>
+          <p:cNvSpPr>
+            <a:spLocks noGrp="1"/>
+          </p:cNvSpPr>
+          <p:nvPr>
+            <p:ph type="title"/>
+          </p:nvPr>
+        </p:nvSpPr>
+        <p:spPr/>
+        <p:txBody>
+          <a:bodyPr anchor="ctr">
+            <a:noAutofit/>
+            <a:scene3d>
+              <a:camera prst="orthographicFront"/>
+              <a:lightRig rig="soft" dir="tl">
+                <a:rot lat="0" lon="0" rev="0"/>
+              </a:lightRig>
+            </a:scene3d>
+            <a:sp3d contourW="25400" prstMaterial="matte">
+              <a:bevelT w="25400" h="55880" prst="artDeco"/>
+              <a:contourClr>
+                <a:schemeClr val="accent2">
+                  <a:tint val="20000"/>
+                </a:schemeClr>
+              </a:contourClr>
+            </a:sp3d>
+          </a:bodyPr>
+          <a:lstStyle/>
+          <a:p>
+            <a:pPr algn="ctr"/>
+            <a:r>
+              <a:rPr lang="en-US" b="1" spc="50" dirty="0">
+                <a:ln w="11430"/>
+                <a:gradFill>
+                  <a:gsLst>
+                    <a:gs pos="25000">
+                      <a:schemeClr val="accent2">
+                        <a:satMod val="155000"/>
+                      </a:schemeClr>
+                    </a:gs>
+                    <a:gs pos="100000">
+                      <a:schemeClr val="accent2">
+                        <a:shade val="45000"/>
+                        <a:satMod val="165000"/>
+                      </a:schemeClr>
+                    </a:gs>
+                  </a:gsLst>
+                  <a:lin ang="5400000"/>
+                </a:gradFill>
+                <a:effectLst>
+                  <a:outerShdw blurRad="76200" dist="50800" dir="5400000" algn="tl" rotWithShape="0">
+                    <a:srgbClr val="000000">
+                      <a:alpha val="65000"/>
+                    </a:srgbClr>
+                  </a:outerShdw>
+                </a:effectLst>
+                <a:latin typeface="Arial" panose="020B0604020202020204" pitchFamily="34" charset="0"/>
+                <a:cs typeface="Arial" panose="020B0604020202020204" pitchFamily="34" charset="0"/>
+              </a:rPr>
+              <a:t>Treatments for prostate </a:t>
+            </a:r>
+            <a:r>
+              <a:rPr lang="en-US" b="1" spc="50" dirty="0" smtClean="0">
+                <a:ln w="11430"/>
+                <a:gradFill>
+                  <a:gsLst>
+                    <a:gs pos="25000">
+                      <a:schemeClr val="accent2">
+                        <a:satMod val="155000"/>
+                      </a:schemeClr>
+                    </a:gs>
+                    <a:gs pos="100000">
+                      <a:schemeClr val="accent2">
+                        <a:shade val="45000"/>
+                        <a:satMod val="165000"/>
+                      </a:schemeClr>
+                    </a:gs>
+                  </a:gsLst>
+                  <a:lin ang="5400000"/>
+                </a:gradFill>
+                <a:effectLst>
+                  <a:outerShdw blurRad="76200" dist="50800" dir="5400000" algn="tl" rotWithShape="0">
+                    <a:srgbClr val="000000">
+                      <a:alpha val="65000"/>
+                    </a:srgbClr>
+                  </a:outerShdw>
+                </a:effectLst>
+                <a:latin typeface="Arial" panose="020B0604020202020204" pitchFamily="34" charset="0"/>
+                <a:cs typeface="Arial" panose="020B0604020202020204" pitchFamily="34" charset="0"/>
+              </a:rPr>
+              <a:t>cancer Cont.</a:t>
+            </a:r>
+            <a:endParaRPr lang="en-US" b="1" spc="50" dirty="0">
+              <a:ln w="11430"/>
+              <a:gradFill>
+                <a:gsLst>
+                  <a:gs pos="25000">
+                    <a:schemeClr val="accent2">
+                      <a:satMod val="155000"/>
+                    </a:schemeClr>
+                  </a:gs>
+                  <a:gs pos="100000">
+                    <a:schemeClr val="accent2">
+                      <a:shade val="45000"/>
+                      <a:satMod val="165000"/>
+                    </a:schemeClr>
+                  </a:gs>
+                </a:gsLst>
+                <a:lin ang="5400000"/>
+              </a:gradFill>
+              <a:effectLst>
+                <a:outerShdw blurRad="76200" dist="50800" dir="5400000" algn="tl" rotWithShape="0">
+                  <a:srgbClr val="000000">
+                    <a:alpha val="65000"/>
+                  </a:srgbClr>
+                </a:outerShdw>
+              </a:effectLst>
+              <a:latin typeface="Arial" panose="020B0604020202020204" pitchFamily="34" charset="0"/>
+              <a:cs typeface="Arial" panose="020B0604020202020204" pitchFamily="34" charset="0"/>
+            </a:endParaRPr>
+          </a:p>
+        </p:txBody>
+      </p:sp>
+    </p:spTree>
+    <p:extLst>
+      <p:ext uri="{BB962C8B-B14F-4D97-AF65-F5344CB8AC3E}">
+        <p14:creationId xmlns:p14="http://schemas.microsoft.com/office/powerpoint/2010/main" val="283384076"/>
+      </p:ext>
+    </p:extLst>
+  </p:cSld>
+  <p:clrMapOvr>
+    <a:masterClrMapping/>
+  </p:clrMapOvr>
+</p:sld>
+</file>
+
+<file path=ppt/slides/slide7.xml><?xml version="1.0" encoding="utf-8"?>
+<p:sld xmlns:a="http://schemas.openxmlformats.org/drawingml/2006/main" xmlns:r="http://schemas.openxmlformats.org/officeDocument/2006/relationships" xmlns:p="http://schemas.openxmlformats.org/presentationml/2006/main">
+  <p:cSld>
+    <p:spTree>
+      <p:nvGrpSpPr>
+        <p:cNvPr id="1" name=""/>
+        <p:cNvGrpSpPr/>
+        <p:nvPr/>
+      </p:nvGrpSpPr>
+      <p:grpSpPr>
+        <a:xfrm>
+          <a:off x="0" y="0"/>
+          <a:ext cx="0" cy="0"/>
+          <a:chOff x="0" y="0"/>
+          <a:chExt cx="0" cy="0"/>
+        </a:xfrm>
+      </p:grpSpPr>
+      <p:sp>
+        <p:nvSpPr>
+          <p:cNvPr id="2" name="Content Placeholder 1"/>
+          <p:cNvSpPr>
+            <a:spLocks noGrp="1"/>
+          </p:cNvSpPr>
+          <p:nvPr>
+            <p:ph sz="quarter" idx="13"/>
+          </p:nvPr>
+        </p:nvSpPr>
+        <p:spPr/>
+        <p:txBody>
+          <a:bodyPr>
+            <a:normAutofit fontScale="70000" lnSpcReduction="20000"/>
+          </a:bodyPr>
+          <a:lstStyle/>
+          <a:p>
+            <a:r>
+              <a:rPr lang="en-US" sz="4500" dirty="0">
+                <a:latin typeface="Arial" panose="020B0604020202020204" pitchFamily="34" charset="0"/>
+                <a:cs typeface="Arial" panose="020B0604020202020204" pitchFamily="34" charset="0"/>
+              </a:rPr>
+              <a:t>The Prostate Cancer Management App is about making it easy for medical patients which are in care for Prostate Cancer to manage their medical data. It is very useful because the patients </a:t>
+            </a:r>
+            <a:r>
+              <a:rPr lang="en-US" sz="4500" dirty="0" smtClean="0">
+                <a:latin typeface="Arial" panose="020B0604020202020204" pitchFamily="34" charset="0"/>
+                <a:cs typeface="Arial" panose="020B0604020202020204" pitchFamily="34" charset="0"/>
+              </a:rPr>
+              <a:t>can, </a:t>
+            </a:r>
+            <a:r>
+              <a:rPr lang="en-US" sz="4500" dirty="0">
+                <a:latin typeface="Arial" panose="020B0604020202020204" pitchFamily="34" charset="0"/>
+                <a:cs typeface="Arial" panose="020B0604020202020204" pitchFamily="34" charset="0"/>
+              </a:rPr>
+              <a:t>from their smartphones, access the app, upload new data as requested by their doctor, and then view the data they uploaded or view the results which would be automatically generated by parameters created by the doctors.</a:t>
+            </a:r>
+          </a:p>
+          <a:p>
+            <a:endParaRPr lang="en-US" dirty="0"/>
+          </a:p>
+        </p:txBody>
+      </p:sp>
+      <p:sp>
+        <p:nvSpPr>
+          <p:cNvPr id="3" name="Title 2"/>
+          <p:cNvSpPr>
+            <a:spLocks noGrp="1"/>
+          </p:cNvSpPr>
+          <p:nvPr>
+            <p:ph type="title"/>
+          </p:nvPr>
+        </p:nvSpPr>
+        <p:spPr/>
+        <p:txBody>
+          <a:bodyPr>
+            <a:scene3d>
+              <a:camera prst="orthographicFront"/>
+              <a:lightRig rig="soft" dir="tl">
+                <a:rot lat="0" lon="0" rev="0"/>
+              </a:lightRig>
+            </a:scene3d>
+            <a:sp3d contourW="25400" prstMaterial="matte">
+              <a:bevelT w="25400" h="55880" prst="artDeco"/>
+              <a:contourClr>
+                <a:schemeClr val="accent2">
+                  <a:tint val="20000"/>
+                </a:schemeClr>
+              </a:contourClr>
+            </a:sp3d>
+          </a:bodyPr>
+          <a:lstStyle/>
+          <a:p>
+            <a:pPr algn="ctr"/>
+            <a:r>
+              <a:rPr lang="en-US" b="1" spc="50" dirty="0" smtClean="0">
+                <a:ln w="11430"/>
+                <a:gradFill>
+                  <a:gsLst>
+                    <a:gs pos="25000">
+                      <a:schemeClr val="accent2">
+                        <a:satMod val="155000"/>
+                      </a:schemeClr>
+                    </a:gs>
+                    <a:gs pos="100000">
+                      <a:schemeClr val="accent2">
+                        <a:shade val="45000"/>
+                        <a:satMod val="165000"/>
+                      </a:schemeClr>
+                    </a:gs>
+                  </a:gsLst>
+                  <a:lin ang="5400000"/>
+                </a:gradFill>
+                <a:effectLst>
+                  <a:outerShdw blurRad="76200" dist="50800" dir="5400000" algn="tl" rotWithShape="0">
+                    <a:srgbClr val="000000">
+                      <a:alpha val="65000"/>
+                    </a:srgbClr>
+                  </a:outerShdw>
+                </a:effectLst>
+                <a:latin typeface="Baskerville Old Face" panose="02020602080505020303" pitchFamily="18" charset="0"/>
+              </a:rPr>
+              <a:t>The App</a:t>
+            </a:r>
+            <a:endParaRPr lang="en-US" b="1" spc="50" dirty="0">
+              <a:ln w="11430"/>
+              <a:gradFill>
+                <a:gsLst>
+                  <a:gs pos="25000">
+                    <a:schemeClr val="accent2">
+                      <a:satMod val="155000"/>
+                    </a:schemeClr>
+                  </a:gs>
+                  <a:gs pos="100000">
+                    <a:schemeClr val="accent2">
+                      <a:shade val="45000"/>
+                      <a:satMod val="165000"/>
+                    </a:schemeClr>
+                  </a:gs>
+                </a:gsLst>
+                <a:lin ang="5400000"/>
+              </a:gradFill>
+              <a:effectLst>
+                <a:outerShdw blurRad="76200" dist="50800" dir="5400000" algn="tl" rotWithShape="0">
+                  <a:srgbClr val="000000">
+                    <a:alpha val="65000"/>
+                  </a:srgbClr>
+                </a:outerShdw>
+              </a:effectLst>
+              <a:latin typeface="Baskerville Old Face" panose="02020602080505020303" pitchFamily="18" charset="0"/>
+            </a:endParaRPr>
+          </a:p>
+        </p:txBody>
+      </p:sp>
+    </p:spTree>
+    <p:extLst>
+      <p:ext uri="{BB962C8B-B14F-4D97-AF65-F5344CB8AC3E}">
+        <p14:creationId xmlns:p14="http://schemas.microsoft.com/office/powerpoint/2010/main" val="2635699890"/>
+      </p:ext>
+    </p:extLst>
+  </p:cSld>
+  <p:clrMapOvr>
+    <a:masterClrMapping/>
+  </p:clrMapOvr>
+</p:sld>
+</file>
+
+<file path=ppt/slides/slide8.xml><?xml version="1.0" encoding="utf-8"?>
+<p:sld xmlns:a="http://schemas.openxmlformats.org/drawingml/2006/main" xmlns:r="http://schemas.openxmlformats.org/officeDocument/2006/relationships" xmlns:p="http://schemas.openxmlformats.org/presentationml/2006/main">
+  <p:cSld>
+    <p:spTree>
+      <p:nvGrpSpPr>
+        <p:cNvPr id="1" name=""/>
+        <p:cNvGrpSpPr/>
+        <p:nvPr/>
+      </p:nvGrpSpPr>
+      <p:grpSpPr>
+        <a:xfrm>
+          <a:off x="0" y="0"/>
+          <a:ext cx="0" cy="0"/>
+          <a:chOff x="0" y="0"/>
+          <a:chExt cx="0" cy="0"/>
+        </a:xfrm>
+      </p:grpSpPr>
+      <p:sp>
+        <p:nvSpPr>
+          <p:cNvPr id="2" name="Content Placeholder 1"/>
+          <p:cNvSpPr>
+            <a:spLocks noGrp="1"/>
+          </p:cNvSpPr>
+          <p:nvPr>
+            <p:ph sz="quarter" idx="13"/>
+          </p:nvPr>
+        </p:nvSpPr>
+        <p:spPr/>
+        <p:txBody>
+          <a:bodyPr>
+            <a:normAutofit fontScale="77500" lnSpcReduction="20000"/>
+          </a:bodyPr>
+          <a:lstStyle/>
+          <a:p>
+            <a:r>
+              <a:rPr lang="en-US" sz="4000" dirty="0">
+                <a:latin typeface="Arial" panose="020B0604020202020204" pitchFamily="34" charset="0"/>
+                <a:cs typeface="Arial" panose="020B0604020202020204" pitchFamily="34" charset="0"/>
+              </a:rPr>
+              <a:t>In comparison to the current system where patients have to schedule consults, drive up to their doctor’s office, and let the doctor do the measurements, the patients could do whatever measurements is necessary with the right steps provided and then upload that data to the app. That way, the doctor can look at the specific patient if necessary or simply not do anything and let the automatically generated results take care of the patient.</a:t>
+            </a:r>
+          </a:p>
+          <a:p>
+            <a:endParaRPr lang="en-US" dirty="0"/>
+          </a:p>
+        </p:txBody>
+      </p:sp>
+      <p:sp>
+        <p:nvSpPr>
+          <p:cNvPr id="3" name="Title 2"/>
+          <p:cNvSpPr>
+            <a:spLocks noGrp="1"/>
+          </p:cNvSpPr>
+          <p:nvPr>
+            <p:ph type="title"/>
+          </p:nvPr>
+        </p:nvSpPr>
+        <p:spPr/>
+        <p:txBody>
+          <a:bodyPr>
+            <a:scene3d>
+              <a:camera prst="orthographicFront"/>
+              <a:lightRig rig="soft" dir="tl">
+                <a:rot lat="0" lon="0" rev="0"/>
+              </a:lightRig>
+            </a:scene3d>
+            <a:sp3d contourW="25400" prstMaterial="matte">
+              <a:bevelT w="25400" h="55880" prst="artDeco"/>
+              <a:contourClr>
+                <a:schemeClr val="accent2">
+                  <a:tint val="20000"/>
+                </a:schemeClr>
+              </a:contourClr>
+            </a:sp3d>
+          </a:bodyPr>
+          <a:lstStyle/>
+          <a:p>
+            <a:pPr algn="ctr"/>
+            <a:r>
+              <a:rPr lang="en-US" b="1" spc="50" dirty="0">
+                <a:ln w="11430"/>
+                <a:gradFill>
+                  <a:gsLst>
+                    <a:gs pos="25000">
+                      <a:schemeClr val="accent2">
+                        <a:satMod val="155000"/>
+                      </a:schemeClr>
+                    </a:gs>
+                    <a:gs pos="100000">
+                      <a:schemeClr val="accent2">
+                        <a:shade val="45000"/>
+                        <a:satMod val="165000"/>
+                      </a:schemeClr>
+                    </a:gs>
+                  </a:gsLst>
+                  <a:lin ang="5400000"/>
+                </a:gradFill>
+                <a:effectLst>
+                  <a:outerShdw blurRad="76200" dist="50800" dir="5400000" algn="tl" rotWithShape="0">
+                    <a:srgbClr val="000000">
+                      <a:alpha val="65000"/>
+                    </a:srgbClr>
+                  </a:outerShdw>
+                </a:effectLst>
+                <a:latin typeface="Baskerville Old Face" panose="02020602080505020303" pitchFamily="18" charset="0"/>
+              </a:rPr>
+              <a:t>About the </a:t>
+            </a:r>
+            <a:r>
+              <a:rPr lang="en-US" b="1" spc="50" dirty="0" smtClean="0">
+                <a:ln w="11430"/>
+                <a:gradFill>
+                  <a:gsLst>
+                    <a:gs pos="25000">
+                      <a:schemeClr val="accent2">
+                        <a:satMod val="155000"/>
+                      </a:schemeClr>
+                    </a:gs>
+                    <a:gs pos="100000">
+                      <a:schemeClr val="accent2">
+                        <a:shade val="45000"/>
+                        <a:satMod val="165000"/>
+                      </a:schemeClr>
+                    </a:gs>
+                  </a:gsLst>
+                  <a:lin ang="5400000"/>
+                </a:gradFill>
+                <a:effectLst>
+                  <a:outerShdw blurRad="76200" dist="50800" dir="5400000" algn="tl" rotWithShape="0">
+                    <a:srgbClr val="000000">
+                      <a:alpha val="65000"/>
+                    </a:srgbClr>
+                  </a:outerShdw>
+                </a:effectLst>
+                <a:latin typeface="Baskerville Old Face" panose="02020602080505020303" pitchFamily="18" charset="0"/>
+              </a:rPr>
+              <a:t>App Cont. </a:t>
+            </a:r>
+            <a:endParaRPr lang="en-US" b="1" spc="50" dirty="0">
+              <a:ln w="11430"/>
+              <a:gradFill>
+                <a:gsLst>
+                  <a:gs pos="25000">
+                    <a:schemeClr val="accent2">
+                      <a:satMod val="155000"/>
+                    </a:schemeClr>
+                  </a:gs>
+                  <a:gs pos="100000">
+                    <a:schemeClr val="accent2">
+                      <a:shade val="45000"/>
+                      <a:satMod val="165000"/>
+                    </a:schemeClr>
+                  </a:gs>
+                </a:gsLst>
+                <a:lin ang="5400000"/>
+              </a:gradFill>
+              <a:effectLst>
+                <a:outerShdw blurRad="76200" dist="50800" dir="5400000" algn="tl" rotWithShape="0">
+                  <a:srgbClr val="000000">
+                    <a:alpha val="65000"/>
+                  </a:srgbClr>
+                </a:outerShdw>
+              </a:effectLst>
+            </a:endParaRPr>
+          </a:p>
+        </p:txBody>
+      </p:sp>
+    </p:spTree>
+    <p:extLst>
+      <p:ext uri="{BB962C8B-B14F-4D97-AF65-F5344CB8AC3E}">
+        <p14:creationId xmlns:p14="http://schemas.microsoft.com/office/powerpoint/2010/main" val="2840072533"/>
+      </p:ext>
+    </p:extLst>
+  </p:cSld>
+  <p:clrMapOvr>
+    <a:masterClrMapping/>
+  </p:clrMapOvr>
+</p:sld>
+</file>
+
+<file path=ppt/slides/slide9.xml><?xml version="1.0" encoding="utf-8"?>
+<p:sld xmlns:a="http://schemas.openxmlformats.org/drawingml/2006/main" xmlns:r="http://schemas.openxmlformats.org/officeDocument/2006/relationships" xmlns:p="http://schemas.openxmlformats.org/presentationml/2006/main">
+  <p:cSld>
+    <p:spTree>
+      <p:nvGrpSpPr>
+        <p:cNvPr id="1" name=""/>
+        <p:cNvGrpSpPr/>
+        <p:nvPr/>
+      </p:nvGrpSpPr>
+      <p:grpSpPr>
+        <a:xfrm>
+          <a:off x="0" y="0"/>
+          <a:ext cx="0" cy="0"/>
+          <a:chOff x="0" y="0"/>
+          <a:chExt cx="0" cy="0"/>
+        </a:xfrm>
+      </p:grpSpPr>
+      <p:sp>
+        <p:nvSpPr>
+          <p:cNvPr id="4" name="Title 3"/>
+          <p:cNvSpPr>
+            <a:spLocks noGrp="1"/>
+          </p:cNvSpPr>
+          <p:nvPr>
+            <p:ph type="title"/>
+          </p:nvPr>
+        </p:nvSpPr>
+        <p:spPr>
+          <a:xfrm>
+            <a:off x="762000" y="1676400"/>
+            <a:ext cx="7680960" cy="3609109"/>
+          </a:xfrm>
+        </p:spPr>
+        <p:txBody>
+          <a:bodyPr>
+            <a:noAutofit/>
+            <a:scene3d>
+              <a:camera prst="orthographicFront"/>
+              <a:lightRig rig="soft" dir="tl">
+                <a:rot lat="0" lon="0" rev="0"/>
+              </a:lightRig>
+            </a:scene3d>
+            <a:sp3d contourW="25400" prstMaterial="matte">
+              <a:bevelT w="25400" h="55880" prst="artDeco"/>
+              <a:contourClr>
+                <a:schemeClr val="accent2">
+                  <a:tint val="20000"/>
+                </a:schemeClr>
+              </a:contourClr>
+            </a:sp3d>
+          </a:bodyPr>
+          <a:lstStyle/>
+          <a:p>
+            <a:pPr algn="ctr"/>
+            <a:r>
+              <a:rPr lang="en-US" sz="8000" b="1" spc="50" dirty="0" smtClean="0">
+                <a:ln w="11430"/>
+                <a:gradFill>
+                  <a:gsLst>
+                    <a:gs pos="25000">
+                      <a:schemeClr val="accent2">
+                        <a:satMod val="155000"/>
+                      </a:schemeClr>
+                    </a:gs>
+                    <a:gs pos="100000">
+                      <a:schemeClr val="accent2">
+                        <a:shade val="45000"/>
+                        <a:satMod val="165000"/>
+                      </a:schemeClr>
+                    </a:gs>
+                  </a:gsLst>
+                  <a:lin ang="5400000"/>
+                </a:gradFill>
+                <a:effectLst>
+                  <a:outerShdw blurRad="76200" dist="50800" dir="5400000" algn="tl" rotWithShape="0">
+                    <a:srgbClr val="000000">
+                      <a:alpha val="65000"/>
+                    </a:srgbClr>
+                  </a:outerShdw>
+                </a:effectLst>
+                <a:latin typeface="Baskerville Old Face" panose="02020602080505020303" pitchFamily="18" charset="0"/>
+              </a:rPr>
+              <a:t>Illustration of the Prostate Cancer Management App</a:t>
+            </a:r>
+            <a:endParaRPr lang="en-US" sz="8000" b="1" spc="50" dirty="0">
+              <a:ln w="11430"/>
+              <a:gradFill>
+                <a:gsLst>
+                  <a:gs pos="25000">
+                    <a:schemeClr val="accent2">
+                      <a:satMod val="155000"/>
+                    </a:schemeClr>
+                  </a:gs>
+                  <a:gs pos="100000">
+                    <a:schemeClr val="accent2">
+                      <a:shade val="45000"/>
+                      <a:satMod val="165000"/>
+                    </a:schemeClr>
+                  </a:gs>
+                </a:gsLst>
+                <a:lin ang="5400000"/>
+              </a:gradFill>
+              <a:effectLst>
+                <a:outerShdw blurRad="76200" dist="50800" dir="5400000" algn="tl" rotWithShape="0">
+                  <a:srgbClr val="000000">
+                    <a:alpha val="65000"/>
+                  </a:srgbClr>
+                </a:outerShdw>
+              </a:effectLst>
+              <a:latin typeface="Baskerville Old Face" panose="02020602080505020303" pitchFamily="18" charset="0"/>
+            </a:endParaRPr>
+          </a:p>
+        </p:txBody>
+      </p:sp>
+    </p:spTree>
+    <p:extLst>
+      <p:ext uri="{BB962C8B-B14F-4D97-AF65-F5344CB8AC3E}">
+        <p14:creationId xmlns:p14="http://schemas.microsoft.com/office/powerpoint/2010/main" val="3552793277"/>
       </p:ext>
     </p:extLst>
   </p:cSld>

</xml_diff>